<commit_message>
FSW Data Update with full set of Relay data
Former-commit-id: debe968a7c69cdc66136c188565fa904ec7dff75
</commit_message>
<xml_diff>
--- a/neuromancer/datasets/FSW/FSW FOPDT model.pptx
+++ b/neuromancer/datasets/FSW/FSW FOPDT model.pptx
@@ -6,7 +6,8 @@
   </p:sldMasterIdLst>
   <p:sldIdLst>
     <p:sldId id="257" r:id="rId5"/>
-    <p:sldId id="258" r:id="rId6"/>
+    <p:sldId id="259" r:id="rId6"/>
+    <p:sldId id="261" r:id="rId7"/>
   </p:sldIdLst>
   <p:sldSz cx="12192000" cy="6858000"/>
   <p:notesSz cx="6858000" cy="9144000"/>
@@ -105,13 +106,18 @@
       </a:defRPr>
     </a:lvl9pPr>
   </p:defaultTextStyle>
+  <p:extLst>
+    <p:ext uri="{EFAFB233-063F-42B5-8137-9DF3F51BA10A}">
+      <p15:sldGuideLst xmlns:p15="http://schemas.microsoft.com/office/powerpoint/2012/main"/>
+    </p:ext>
+  </p:extLst>
 </p:presentation>
 </file>
 
 <file path=ppt/revisionInfo.xml><?xml version="1.0" encoding="utf-8"?>
 <p1510:revInfo xmlns:a="http://schemas.openxmlformats.org/drawingml/2006/main" xmlns:r="http://schemas.openxmlformats.org/officeDocument/2006/relationships" xmlns:p1510="http://schemas.microsoft.com/office/powerpoint/2015/10/main">
   <p1510:revLst>
-    <p1510:client id="{8D89D22C-1E18-42B1-A33E-27F78AA1DBF9}" v="249" dt="2020-09-01T15:07:19.741"/>
+    <p1510:client id="{8D89D22C-1E18-42B1-A33E-27F78AA1DBF9}" v="269" dt="2020-09-03T22:24:31.596"/>
   </p1510:revLst>
 </p1510:revInfo>
 </file>
@@ -121,7 +127,7 @@
   <pc:docChgLst>
     <pc:chgData name="Choi, Woongjo" userId="1ff5f757-92ce-4bdb-9655-e9d98b455b7b" providerId="ADAL" clId="{8D89D22C-1E18-42B1-A33E-27F78AA1DBF9}"/>
     <pc:docChg chg="undo custSel addSld delSld modSld">
-      <pc:chgData name="Choi, Woongjo" userId="1ff5f757-92ce-4bdb-9655-e9d98b455b7b" providerId="ADAL" clId="{8D89D22C-1E18-42B1-A33E-27F78AA1DBF9}" dt="2020-09-01T15:06:59.211" v="349" actId="404"/>
+      <pc:chgData name="Choi, Woongjo" userId="1ff5f757-92ce-4bdb-9655-e9d98b455b7b" providerId="ADAL" clId="{8D89D22C-1E18-42B1-A33E-27F78AA1DBF9}" dt="2020-09-03T22:24:50.660" v="559" actId="14100"/>
       <pc:docMkLst>
         <pc:docMk/>
       </pc:docMkLst>
@@ -179,8 +185,8 @@
           </ac:picMkLst>
         </pc:picChg>
       </pc:sldChg>
-      <pc:sldChg chg="addSp delSp modSp add mod">
-        <pc:chgData name="Choi, Woongjo" userId="1ff5f757-92ce-4bdb-9655-e9d98b455b7b" providerId="ADAL" clId="{8D89D22C-1E18-42B1-A33E-27F78AA1DBF9}" dt="2020-09-01T15:06:59.211" v="349" actId="404"/>
+      <pc:sldChg chg="addSp delSp modSp add del mod">
+        <pc:chgData name="Choi, Woongjo" userId="1ff5f757-92ce-4bdb-9655-e9d98b455b7b" providerId="ADAL" clId="{8D89D22C-1E18-42B1-A33E-27F78AA1DBF9}" dt="2020-09-02T20:52:41.755" v="388" actId="2696"/>
         <pc:sldMkLst>
           <pc:docMk/>
           <pc:sldMk cId="3777947122" sldId="258"/>
@@ -210,2946 +216,150 @@
           </ac:graphicFrameMkLst>
         </pc:graphicFrameChg>
       </pc:sldChg>
+      <pc:sldChg chg="addSp delSp modSp add">
+        <pc:chgData name="Choi, Woongjo" userId="1ff5f757-92ce-4bdb-9655-e9d98b455b7b" providerId="ADAL" clId="{8D89D22C-1E18-42B1-A33E-27F78AA1DBF9}" dt="2020-09-03T22:24:50.660" v="559" actId="14100"/>
+        <pc:sldMkLst>
+          <pc:docMk/>
+          <pc:sldMk cId="2637080956" sldId="259"/>
+        </pc:sldMkLst>
+        <pc:spChg chg="del">
+          <ac:chgData name="Choi, Woongjo" userId="1ff5f757-92ce-4bdb-9655-e9d98b455b7b" providerId="ADAL" clId="{8D89D22C-1E18-42B1-A33E-27F78AA1DBF9}" dt="2020-09-02T20:17:40.019" v="354" actId="478"/>
+          <ac:spMkLst>
+            <pc:docMk/>
+            <pc:sldMk cId="2637080956" sldId="259"/>
+            <ac:spMk id="2" creationId="{35FD2EFD-690F-4F55-905F-A598136997A2}"/>
+          </ac:spMkLst>
+        </pc:spChg>
+        <pc:spChg chg="add mod">
+          <ac:chgData name="Choi, Woongjo" userId="1ff5f757-92ce-4bdb-9655-e9d98b455b7b" providerId="ADAL" clId="{8D89D22C-1E18-42B1-A33E-27F78AA1DBF9}" dt="2020-09-03T22:24:09.854" v="547" actId="20577"/>
+          <ac:spMkLst>
+            <pc:docMk/>
+            <pc:sldMk cId="2637080956" sldId="259"/>
+            <ac:spMk id="2" creationId="{49C490E0-1399-420B-95B3-B94593600E4B}"/>
+          </ac:spMkLst>
+        </pc:spChg>
+        <pc:spChg chg="del">
+          <ac:chgData name="Choi, Woongjo" userId="1ff5f757-92ce-4bdb-9655-e9d98b455b7b" providerId="ADAL" clId="{8D89D22C-1E18-42B1-A33E-27F78AA1DBF9}" dt="2020-09-02T20:17:41.012" v="355" actId="478"/>
+          <ac:spMkLst>
+            <pc:docMk/>
+            <pc:sldMk cId="2637080956" sldId="259"/>
+            <ac:spMk id="3" creationId="{83F14887-4D5A-4A0C-B3C9-CD45188BB23D}"/>
+          </ac:spMkLst>
+        </pc:spChg>
+        <pc:spChg chg="add mod">
+          <ac:chgData name="Choi, Woongjo" userId="1ff5f757-92ce-4bdb-9655-e9d98b455b7b" providerId="ADAL" clId="{8D89D22C-1E18-42B1-A33E-27F78AA1DBF9}" dt="2020-09-03T22:24:50.660" v="559" actId="14100"/>
+          <ac:spMkLst>
+            <pc:docMk/>
+            <pc:sldMk cId="2637080956" sldId="259"/>
+            <ac:spMk id="3" creationId="{EBAD0606-146D-425D-80C2-F071536BF72D}"/>
+          </ac:spMkLst>
+        </pc:spChg>
+        <pc:spChg chg="add mod">
+          <ac:chgData name="Choi, Woongjo" userId="1ff5f757-92ce-4bdb-9655-e9d98b455b7b" providerId="ADAL" clId="{8D89D22C-1E18-42B1-A33E-27F78AA1DBF9}" dt="2020-09-02T20:18:08.157" v="362" actId="1076"/>
+          <ac:spMkLst>
+            <pc:docMk/>
+            <pc:sldMk cId="2637080956" sldId="259"/>
+            <ac:spMk id="5" creationId="{4FD1273A-91BC-421B-900B-008C1A6EEFAA}"/>
+          </ac:spMkLst>
+        </pc:spChg>
+        <pc:grpChg chg="add mod">
+          <ac:chgData name="Choi, Woongjo" userId="1ff5f757-92ce-4bdb-9655-e9d98b455b7b" providerId="ADAL" clId="{8D89D22C-1E18-42B1-A33E-27F78AA1DBF9}" dt="2020-09-03T22:19:24.237" v="501" actId="164"/>
+          <ac:grpSpMkLst>
+            <pc:docMk/>
+            <pc:sldMk cId="2637080956" sldId="259"/>
+            <ac:grpSpMk id="4" creationId="{343D4652-D0AD-42FA-8A6C-F419D96FD61C}"/>
+          </ac:grpSpMkLst>
+        </pc:grpChg>
+        <pc:picChg chg="add del mod">
+          <ac:chgData name="Choi, Woongjo" userId="1ff5f757-92ce-4bdb-9655-e9d98b455b7b" providerId="ADAL" clId="{8D89D22C-1E18-42B1-A33E-27F78AA1DBF9}" dt="2020-09-02T20:18:59.779" v="363" actId="478"/>
+          <ac:picMkLst>
+            <pc:docMk/>
+            <pc:sldMk cId="2637080956" sldId="259"/>
+            <ac:picMk id="4" creationId="{9CE0DBD5-8CDF-4708-8E8B-E491FBA96CB7}"/>
+          </ac:picMkLst>
+        </pc:picChg>
+        <pc:picChg chg="add del mod">
+          <ac:chgData name="Choi, Woongjo" userId="1ff5f757-92ce-4bdb-9655-e9d98b455b7b" providerId="ADAL" clId="{8D89D22C-1E18-42B1-A33E-27F78AA1DBF9}" dt="2020-09-02T20:50:25.366" v="370" actId="478"/>
+          <ac:picMkLst>
+            <pc:docMk/>
+            <pc:sldMk cId="2637080956" sldId="259"/>
+            <ac:picMk id="6" creationId="{DE571E67-6723-46E8-B41A-0A52768D5C77}"/>
+          </ac:picMkLst>
+        </pc:picChg>
+        <pc:picChg chg="add mod">
+          <ac:chgData name="Choi, Woongjo" userId="1ff5f757-92ce-4bdb-9655-e9d98b455b7b" providerId="ADAL" clId="{8D89D22C-1E18-42B1-A33E-27F78AA1DBF9}" dt="2020-09-02T20:50:36.231" v="377" actId="1076"/>
+          <ac:picMkLst>
+            <pc:docMk/>
+            <pc:sldMk cId="2637080956" sldId="259"/>
+            <ac:picMk id="7" creationId="{33E2B3B0-AEB4-4FA5-BB7D-071573FDFE5A}"/>
+          </ac:picMkLst>
+        </pc:picChg>
+      </pc:sldChg>
+      <pc:sldChg chg="add del">
+        <pc:chgData name="Choi, Woongjo" userId="1ff5f757-92ce-4bdb-9655-e9d98b455b7b" providerId="ADAL" clId="{8D89D22C-1E18-42B1-A33E-27F78AA1DBF9}" dt="2020-09-02T20:50:44.868" v="380" actId="2696"/>
+        <pc:sldMkLst>
+          <pc:docMk/>
+          <pc:sldMk cId="1276944039" sldId="260"/>
+        </pc:sldMkLst>
+      </pc:sldChg>
+      <pc:sldChg chg="addSp delSp modSp add">
+        <pc:chgData name="Choi, Woongjo" userId="1ff5f757-92ce-4bdb-9655-e9d98b455b7b" providerId="ADAL" clId="{8D89D22C-1E18-42B1-A33E-27F78AA1DBF9}" dt="2020-09-03T22:24:40.681" v="558" actId="14100"/>
+        <pc:sldMkLst>
+          <pc:docMk/>
+          <pc:sldMk cId="1442489572" sldId="261"/>
+        </pc:sldMkLst>
+        <pc:spChg chg="mod">
+          <ac:chgData name="Choi, Woongjo" userId="1ff5f757-92ce-4bdb-9655-e9d98b455b7b" providerId="ADAL" clId="{8D89D22C-1E18-42B1-A33E-27F78AA1DBF9}" dt="2020-09-02T20:51:52.087" v="383" actId="20577"/>
+          <ac:spMkLst>
+            <pc:docMk/>
+            <pc:sldMk cId="1442489572" sldId="261"/>
+            <ac:spMk id="5" creationId="{4FD1273A-91BC-421B-900B-008C1A6EEFAA}"/>
+          </ac:spMkLst>
+        </pc:spChg>
+        <pc:spChg chg="mod">
+          <ac:chgData name="Choi, Woongjo" userId="1ff5f757-92ce-4bdb-9655-e9d98b455b7b" providerId="ADAL" clId="{8D89D22C-1E18-42B1-A33E-27F78AA1DBF9}" dt="2020-09-03T22:24:34.347" v="557" actId="20577"/>
+          <ac:spMkLst>
+            <pc:docMk/>
+            <pc:sldMk cId="1442489572" sldId="261"/>
+            <ac:spMk id="6" creationId="{05DA8783-54DE-42A4-AFA6-85BF8C1B6347}"/>
+          </ac:spMkLst>
+        </pc:spChg>
+        <pc:spChg chg="mod">
+          <ac:chgData name="Choi, Woongjo" userId="1ff5f757-92ce-4bdb-9655-e9d98b455b7b" providerId="ADAL" clId="{8D89D22C-1E18-42B1-A33E-27F78AA1DBF9}" dt="2020-09-03T22:24:40.681" v="558" actId="14100"/>
+          <ac:spMkLst>
+            <pc:docMk/>
+            <pc:sldMk cId="1442489572" sldId="261"/>
+            <ac:spMk id="7" creationId="{FB9838CA-BC68-4CF1-A0A3-59DAA45A77ED}"/>
+          </ac:spMkLst>
+        </pc:spChg>
+        <pc:grpChg chg="add">
+          <ac:chgData name="Choi, Woongjo" userId="1ff5f757-92ce-4bdb-9655-e9d98b455b7b" providerId="ADAL" clId="{8D89D22C-1E18-42B1-A33E-27F78AA1DBF9}" dt="2020-09-03T22:19:27.135" v="502"/>
+          <ac:grpSpMkLst>
+            <pc:docMk/>
+            <pc:sldMk cId="1442489572" sldId="261"/>
+            <ac:grpSpMk id="4" creationId="{359DFF18-DF63-4138-B70B-3229D47D90BB}"/>
+          </ac:grpSpMkLst>
+        </pc:grpChg>
+        <pc:picChg chg="add mod">
+          <ac:chgData name="Choi, Woongjo" userId="1ff5f757-92ce-4bdb-9655-e9d98b455b7b" providerId="ADAL" clId="{8D89D22C-1E18-42B1-A33E-27F78AA1DBF9}" dt="2020-09-02T20:52:07.358" v="387" actId="1076"/>
+          <ac:picMkLst>
+            <pc:docMk/>
+            <pc:sldMk cId="1442489572" sldId="261"/>
+            <ac:picMk id="2" creationId="{EFB2DDC5-12E4-4A69-9194-501C6B7CF5AC}"/>
+          </ac:picMkLst>
+        </pc:picChg>
+        <pc:picChg chg="del">
+          <ac:chgData name="Choi, Woongjo" userId="1ff5f757-92ce-4bdb-9655-e9d98b455b7b" providerId="ADAL" clId="{8D89D22C-1E18-42B1-A33E-27F78AA1DBF9}" dt="2020-09-02T20:51:54.094" v="384" actId="478"/>
+          <ac:picMkLst>
+            <pc:docMk/>
+            <pc:sldMk cId="1442489572" sldId="261"/>
+            <ac:picMk id="7" creationId="{33E2B3B0-AEB4-4FA5-BB7D-071573FDFE5A}"/>
+          </ac:picMkLst>
+        </pc:picChg>
+      </pc:sldChg>
     </pc:docChg>
   </pc:docChgLst>
 </pc:chgInfo>
-</file>
-
-<file path=ppt/charts/chart1.xml><?xml version="1.0" encoding="utf-8"?>
-<c:chartSpace xmlns:c="http://schemas.openxmlformats.org/drawingml/2006/chart" xmlns:a="http://schemas.openxmlformats.org/drawingml/2006/main" xmlns:r="http://schemas.openxmlformats.org/officeDocument/2006/relationships" xmlns:c16r2="http://schemas.microsoft.com/office/drawing/2015/06/chart">
-  <c:date1904 val="0"/>
-  <c:lang val="en-US"/>
-  <c:roundedCorners val="0"/>
-  <mc:AlternateContent xmlns:mc="http://schemas.openxmlformats.org/markup-compatibility/2006">
-    <mc:Choice xmlns:c14="http://schemas.microsoft.com/office/drawing/2007/8/2/chart" Requires="c14">
-      <c14:style val="102"/>
-    </mc:Choice>
-    <mc:Fallback>
-      <c:style val="2"/>
-    </mc:Fallback>
-  </mc:AlternateContent>
-  <c:chart>
-    <c:autoTitleDeleted val="0"/>
-    <c:plotArea>
-      <c:layout/>
-      <c:scatterChart>
-        <c:scatterStyle val="smoothMarker"/>
-        <c:varyColors val="0"/>
-        <c:ser>
-          <c:idx val="0"/>
-          <c:order val="0"/>
-          <c:tx>
-            <c:strRef>
-              <c:f>'WELD DATA (2)'!$Y$1</c:f>
-              <c:strCache>
-                <c:ptCount val="1"/>
-                <c:pt idx="0">
-                  <c:v>TC1_FILTERED</c:v>
-                </c:pt>
-              </c:strCache>
-            </c:strRef>
-          </c:tx>
-          <c:marker>
-            <c:symbol val="none"/>
-          </c:marker>
-          <c:xVal>
-            <c:numRef>
-              <c:f>'WELD DATA (2)'!$C$2:$C$2211</c:f>
-              <c:numCache>
-                <c:formatCode>0.00</c:formatCode>
-                <c:ptCount val="218"/>
-                <c:pt idx="0">
-                  <c:v>85.686999999999003</c:v>
-                </c:pt>
-                <c:pt idx="1">
-                  <c:v>85.796999999997325</c:v>
-                </c:pt>
-                <c:pt idx="2">
-                  <c:v>85.905999999999239</c:v>
-                </c:pt>
-                <c:pt idx="3">
-                  <c:v>86.015999999997561</c:v>
-                </c:pt>
-                <c:pt idx="4">
-                  <c:v>86.140999999999579</c:v>
-                </c:pt>
-                <c:pt idx="5">
-                  <c:v>86.250000000001492</c:v>
-                </c:pt>
-                <c:pt idx="6">
-                  <c:v>86.359000000003405</c:v>
-                </c:pt>
-                <c:pt idx="7">
-                  <c:v>86.469000000001728</c:v>
-                </c:pt>
-                <c:pt idx="8">
-                  <c:v>86.577999999994049</c:v>
-                </c:pt>
-                <c:pt idx="9">
-                  <c:v>86.686999999995962</c:v>
-                </c:pt>
-                <c:pt idx="10">
-                  <c:v>86.81199999999798</c:v>
-                </c:pt>
-                <c:pt idx="11">
-                  <c:v>86.936999999999998</c:v>
-                </c:pt>
-                <c:pt idx="12">
-                  <c:v>87.04699999999832</c:v>
-                </c:pt>
-                <c:pt idx="13">
-                  <c:v>87.172000000000338</c:v>
-                </c:pt>
-                <c:pt idx="14">
-                  <c:v>87.281000000002251</c:v>
-                </c:pt>
-                <c:pt idx="15">
-                  <c:v>87.391000000000574</c:v>
-                </c:pt>
-                <c:pt idx="16">
-                  <c:v>87.500000000002487</c:v>
-                </c:pt>
-                <c:pt idx="17">
-                  <c:v>87.625000000004505</c:v>
-                </c:pt>
-                <c:pt idx="18">
-                  <c:v>87.733999999996826</c:v>
-                </c:pt>
-                <c:pt idx="19">
-                  <c:v>87.843999999995148</c:v>
-                </c:pt>
-                <c:pt idx="20">
-                  <c:v>87.952999999997061</c:v>
-                </c:pt>
-                <c:pt idx="21">
-                  <c:v>88.077999999999079</c:v>
-                </c:pt>
-                <c:pt idx="22">
-                  <c:v>88.187000000000992</c:v>
-                </c:pt>
-                <c:pt idx="23">
-                  <c:v>88.296999999999315</c:v>
-                </c:pt>
-                <c:pt idx="24">
-                  <c:v>88.406000000001228</c:v>
-                </c:pt>
-                <c:pt idx="25">
-                  <c:v>88.515999999999551</c:v>
-                </c:pt>
-                <c:pt idx="26">
-                  <c:v>88.641000000001569</c:v>
-                </c:pt>
-                <c:pt idx="27">
-                  <c:v>88.750000000003482</c:v>
-                </c:pt>
-                <c:pt idx="28">
-                  <c:v>88.859000000005395</c:v>
-                </c:pt>
-                <c:pt idx="29">
-                  <c:v>88.98399999999782</c:v>
-                </c:pt>
-                <c:pt idx="30">
-                  <c:v>89.093999999996143</c:v>
-                </c:pt>
-                <c:pt idx="31">
-                  <c:v>89.202999999998056</c:v>
-                </c:pt>
-                <c:pt idx="32">
-                  <c:v>89.311999999999969</c:v>
-                </c:pt>
-                <c:pt idx="33">
-                  <c:v>89.421999999998292</c:v>
-                </c:pt>
-                <c:pt idx="34">
-                  <c:v>89.531000000000205</c:v>
-                </c:pt>
-                <c:pt idx="35">
-                  <c:v>89.656000000002223</c:v>
-                </c:pt>
-                <c:pt idx="36">
-                  <c:v>89.766000000000545</c:v>
-                </c:pt>
-                <c:pt idx="37">
-                  <c:v>89.875000000002458</c:v>
-                </c:pt>
-                <c:pt idx="38">
-                  <c:v>89.984000000004372</c:v>
-                </c:pt>
-                <c:pt idx="39">
-                  <c:v>90.108999999996797</c:v>
-                </c:pt>
-                <c:pt idx="40">
-                  <c:v>90.21899999999512</c:v>
-                </c:pt>
-                <c:pt idx="41">
-                  <c:v>90.327999999997033</c:v>
-                </c:pt>
-                <c:pt idx="42">
-                  <c:v>90.436999999998946</c:v>
-                </c:pt>
-                <c:pt idx="43">
-                  <c:v>90.546999999997269</c:v>
-                </c:pt>
-                <c:pt idx="44">
-                  <c:v>90.671999999999287</c:v>
-                </c:pt>
-                <c:pt idx="45">
-                  <c:v>90.7810000000012</c:v>
-                </c:pt>
-                <c:pt idx="46">
-                  <c:v>90.890999999999522</c:v>
-                </c:pt>
-                <c:pt idx="47">
-                  <c:v>91.000000000001435</c:v>
-                </c:pt>
-                <c:pt idx="48">
-                  <c:v>91.109000000003348</c:v>
-                </c:pt>
-                <c:pt idx="49">
-                  <c:v>91.234000000005366</c:v>
-                </c:pt>
-                <c:pt idx="50">
-                  <c:v>91.343999999994097</c:v>
-                </c:pt>
-                <c:pt idx="51">
-                  <c:v>91.45299999999601</c:v>
-                </c:pt>
-                <c:pt idx="52">
-                  <c:v>91.561999999997923</c:v>
-                </c:pt>
-                <c:pt idx="53">
-                  <c:v>91.686999999999941</c:v>
-                </c:pt>
-                <c:pt idx="54">
-                  <c:v>91.796999999998263</c:v>
-                </c:pt>
-                <c:pt idx="55">
-                  <c:v>91.906000000000176</c:v>
-                </c:pt>
-                <c:pt idx="56">
-                  <c:v>92.015999999998499</c:v>
-                </c:pt>
-                <c:pt idx="57">
-                  <c:v>92.125000000000412</c:v>
-                </c:pt>
-                <c:pt idx="58">
-                  <c:v>92.25000000000243</c:v>
-                </c:pt>
-                <c:pt idx="59">
-                  <c:v>92.359000000004343</c:v>
-                </c:pt>
-                <c:pt idx="60">
-                  <c:v>92.468999999993073</c:v>
-                </c:pt>
-                <c:pt idx="61">
-                  <c:v>92.577999999994987</c:v>
-                </c:pt>
-                <c:pt idx="62">
-                  <c:v>92.6869999999969</c:v>
-                </c:pt>
-                <c:pt idx="63">
-                  <c:v>92.797000000004815</c:v>
-                </c:pt>
-                <c:pt idx="64">
-                  <c:v>92.92199999999724</c:v>
-                </c:pt>
-                <c:pt idx="65">
-                  <c:v>93.030999999999153</c:v>
-                </c:pt>
-                <c:pt idx="66">
-                  <c:v>93.140999999997476</c:v>
-                </c:pt>
-                <c:pt idx="67">
-                  <c:v>93.265999999999494</c:v>
-                </c:pt>
-                <c:pt idx="68">
-                  <c:v>93.375000000001407</c:v>
-                </c:pt>
-                <c:pt idx="69">
-                  <c:v>93.48400000000332</c:v>
-                </c:pt>
-                <c:pt idx="70">
-                  <c:v>93.594000000001643</c:v>
-                </c:pt>
-                <c:pt idx="71">
-                  <c:v>93.702999999993963</c:v>
-                </c:pt>
-                <c:pt idx="72">
-                  <c:v>93.811999999995876</c:v>
-                </c:pt>
-                <c:pt idx="73">
-                  <c:v>93.922000000003791</c:v>
-                </c:pt>
-                <c:pt idx="74">
-                  <c:v>94.047000000005809</c:v>
-                </c:pt>
-                <c:pt idx="75">
-                  <c:v>94.15599999999813</c:v>
-                </c:pt>
-                <c:pt idx="76">
-                  <c:v>94.281000000000148</c:v>
-                </c:pt>
-                <c:pt idx="77">
-                  <c:v>94.390999999998471</c:v>
-                </c:pt>
-                <c:pt idx="78">
-                  <c:v>94.500000000000384</c:v>
-                </c:pt>
-                <c:pt idx="79">
-                  <c:v>94.609000000002297</c:v>
-                </c:pt>
-                <c:pt idx="80">
-                  <c:v>94.719000000000619</c:v>
-                </c:pt>
-                <c:pt idx="81">
-                  <c:v>94.828000000002532</c:v>
-                </c:pt>
-                <c:pt idx="82">
-                  <c:v>94.936999999994853</c:v>
-                </c:pt>
-                <c:pt idx="83">
-                  <c:v>95.061999999996871</c:v>
-                </c:pt>
-                <c:pt idx="84">
-                  <c:v>95.172000000004786</c:v>
-                </c:pt>
-                <c:pt idx="85">
-                  <c:v>95.280999999997107</c:v>
-                </c:pt>
-                <c:pt idx="86">
-                  <c:v>95.390999999995429</c:v>
-                </c:pt>
-                <c:pt idx="87">
-                  <c:v>95.499999999997343</c:v>
-                </c:pt>
-                <c:pt idx="88">
-                  <c:v>95.608999999999256</c:v>
-                </c:pt>
-                <c:pt idx="89">
-                  <c:v>95.718999999997578</c:v>
-                </c:pt>
-                <c:pt idx="90">
-                  <c:v>95.843999999999596</c:v>
-                </c:pt>
-                <c:pt idx="91">
-                  <c:v>95.953000000001509</c:v>
-                </c:pt>
-                <c:pt idx="92">
-                  <c:v>96.077999999993935</c:v>
-                </c:pt>
-                <c:pt idx="93">
-                  <c:v>96.186999999995848</c:v>
-                </c:pt>
-                <c:pt idx="94">
-                  <c:v>96.311999999997866</c:v>
-                </c:pt>
-                <c:pt idx="95">
-                  <c:v>96.422000000005781</c:v>
-                </c:pt>
-                <c:pt idx="96">
-                  <c:v>96.530999999998102</c:v>
-                </c:pt>
-                <c:pt idx="97">
-                  <c:v>96.640999999996424</c:v>
-                </c:pt>
-                <c:pt idx="98">
-                  <c:v>96.749999999998337</c:v>
-                </c:pt>
-                <c:pt idx="99">
-                  <c:v>96.85900000000025</c:v>
-                </c:pt>
-                <c:pt idx="100">
-                  <c:v>96.968999999998573</c:v>
-                </c:pt>
-                <c:pt idx="101">
-                  <c:v>97.094000000000591</c:v>
-                </c:pt>
-                <c:pt idx="102">
-                  <c:v>97.203000000002504</c:v>
-                </c:pt>
-                <c:pt idx="103">
-                  <c:v>97.311999999994825</c:v>
-                </c:pt>
-                <c:pt idx="104">
-                  <c:v>97.436999999996843</c:v>
-                </c:pt>
-                <c:pt idx="105">
-                  <c:v>97.547000000004758</c:v>
-                </c:pt>
-                <c:pt idx="106">
-                  <c:v>97.655999999997078</c:v>
-                </c:pt>
-                <c:pt idx="107">
-                  <c:v>97.765999999995401</c:v>
-                </c:pt>
-                <c:pt idx="108">
-                  <c:v>97.874999999997314</c:v>
-                </c:pt>
-                <c:pt idx="109">
-                  <c:v>97.983999999999227</c:v>
-                </c:pt>
-                <c:pt idx="110">
-                  <c:v>98.109000000001245</c:v>
-                </c:pt>
-                <c:pt idx="111">
-                  <c:v>98.218999999999568</c:v>
-                </c:pt>
-                <c:pt idx="112">
-                  <c:v>98.344000000001586</c:v>
-                </c:pt>
-                <c:pt idx="113">
-                  <c:v>98.452999999993906</c:v>
-                </c:pt>
-                <c:pt idx="114">
-                  <c:v>98.56199999999582</c:v>
-                </c:pt>
-                <c:pt idx="115">
-                  <c:v>98.672000000003734</c:v>
-                </c:pt>
-                <c:pt idx="116">
-                  <c:v>98.797000000005752</c:v>
-                </c:pt>
-                <c:pt idx="117">
-                  <c:v>98.905999999998073</c:v>
-                </c:pt>
-                <c:pt idx="118">
-                  <c:v>99.015999999996396</c:v>
-                </c:pt>
-                <c:pt idx="119">
-                  <c:v>99.124999999998309</c:v>
-                </c:pt>
-                <c:pt idx="120">
-                  <c:v>99.250000000000327</c:v>
-                </c:pt>
-                <c:pt idx="121">
-                  <c:v>99.35900000000224</c:v>
-                </c:pt>
-                <c:pt idx="122">
-                  <c:v>99.469000000000563</c:v>
-                </c:pt>
-                <c:pt idx="123">
-                  <c:v>99.578000000002476</c:v>
-                </c:pt>
-                <c:pt idx="124">
-                  <c:v>99.686999999994796</c:v>
-                </c:pt>
-                <c:pt idx="125">
-                  <c:v>99.811999999996814</c:v>
-                </c:pt>
-                <c:pt idx="126">
-                  <c:v>99.922000000004729</c:v>
-                </c:pt>
-                <c:pt idx="127">
-                  <c:v>100.03099999999705</c:v>
-                </c:pt>
-                <c:pt idx="128">
-                  <c:v>100.14099999999537</c:v>
-                </c:pt>
-                <c:pt idx="129">
-                  <c:v>100.26599999999739</c:v>
-                </c:pt>
-                <c:pt idx="130">
-                  <c:v>100.3749999999993</c:v>
-                </c:pt>
-                <c:pt idx="131">
-                  <c:v>100.48400000000122</c:v>
-                </c:pt>
-                <c:pt idx="132">
-                  <c:v>100.59399999999954</c:v>
-                </c:pt>
-                <c:pt idx="133">
-                  <c:v>100.70300000000145</c:v>
-                </c:pt>
-                <c:pt idx="134">
-                  <c:v>100.82799999999388</c:v>
-                </c:pt>
-                <c:pt idx="135">
-                  <c:v>100.93699999999579</c:v>
-                </c:pt>
-                <c:pt idx="136">
-                  <c:v>101.04700000000371</c:v>
-                </c:pt>
-                <c:pt idx="137">
-                  <c:v>101.15600000000562</c:v>
-                </c:pt>
-                <c:pt idx="138">
-                  <c:v>101.28099999999804</c:v>
-                </c:pt>
-                <c:pt idx="139">
-                  <c:v>101.39099999999637</c:v>
-                </c:pt>
-                <c:pt idx="140">
-                  <c:v>101.49999999999828</c:v>
-                </c:pt>
-                <c:pt idx="141">
-                  <c:v>101.60900000000019</c:v>
-                </c:pt>
-                <c:pt idx="142">
-                  <c:v>101.71899999999852</c:v>
-                </c:pt>
-                <c:pt idx="143">
-                  <c:v>101.84400000000053</c:v>
-                </c:pt>
-                <c:pt idx="144">
-                  <c:v>101.95300000000245</c:v>
-                </c:pt>
-                <c:pt idx="145">
-                  <c:v>102.06199999999477</c:v>
-                </c:pt>
-                <c:pt idx="146">
-                  <c:v>102.18699999999679</c:v>
-                </c:pt>
-                <c:pt idx="147">
-                  <c:v>102.2970000000047</c:v>
-                </c:pt>
-                <c:pt idx="148">
-                  <c:v>102.40599999999702</c:v>
-                </c:pt>
-                <c:pt idx="149">
-                  <c:v>102.51599999999534</c:v>
-                </c:pt>
-                <c:pt idx="150">
-                  <c:v>102.62499999999726</c:v>
-                </c:pt>
-                <c:pt idx="151">
-                  <c:v>102.73399999999917</c:v>
-                </c:pt>
-                <c:pt idx="152">
-                  <c:v>102.85900000000119</c:v>
-                </c:pt>
-                <c:pt idx="153">
-                  <c:v>102.96899999999951</c:v>
-                </c:pt>
-                <c:pt idx="154">
-                  <c:v>103.07800000000142</c:v>
-                </c:pt>
-                <c:pt idx="155">
-                  <c:v>103.18699999999374</c:v>
-                </c:pt>
-                <c:pt idx="156">
-                  <c:v>103.29700000000166</c:v>
-                </c:pt>
-                <c:pt idx="157">
-                  <c:v>103.42200000000368</c:v>
-                </c:pt>
-                <c:pt idx="158">
-                  <c:v>103.53100000000559</c:v>
-                </c:pt>
-                <c:pt idx="159">
-                  <c:v>103.64099999999432</c:v>
-                </c:pt>
-                <c:pt idx="160">
-                  <c:v>103.74999999999623</c:v>
-                </c:pt>
-                <c:pt idx="161">
-                  <c:v>103.85899999999815</c:v>
-                </c:pt>
-                <c:pt idx="162">
-                  <c:v>103.96899999999647</c:v>
-                </c:pt>
-                <c:pt idx="163">
-                  <c:v>104.09399999999849</c:v>
-                </c:pt>
-                <c:pt idx="164">
-                  <c:v>104.2030000000004</c:v>
-                </c:pt>
-                <c:pt idx="165">
-                  <c:v>104.31200000000231</c:v>
-                </c:pt>
-                <c:pt idx="166">
-                  <c:v>104.42200000000064</c:v>
-                </c:pt>
-                <c:pt idx="167">
-                  <c:v>104.54700000000265</c:v>
-                </c:pt>
-                <c:pt idx="168">
-                  <c:v>104.65600000000457</c:v>
-                </c:pt>
-                <c:pt idx="169">
-                  <c:v>104.7659999999933</c:v>
-                </c:pt>
-                <c:pt idx="170">
-                  <c:v>104.87499999999521</c:v>
-                </c:pt>
-                <c:pt idx="171">
-                  <c:v>104.98399999999712</c:v>
-                </c:pt>
-                <c:pt idx="172">
-                  <c:v>105.09400000000504</c:v>
-                </c:pt>
-                <c:pt idx="173">
-                  <c:v>105.20299999999736</c:v>
-                </c:pt>
-                <c:pt idx="174">
-                  <c:v>105.32799999999938</c:v>
-                </c:pt>
-                <c:pt idx="175">
-                  <c:v>105.43700000000129</c:v>
-                </c:pt>
-                <c:pt idx="176">
-                  <c:v>105.54699999999961</c:v>
-                </c:pt>
-                <c:pt idx="177">
-                  <c:v>105.65600000000153</c:v>
-                </c:pt>
-                <c:pt idx="178">
-                  <c:v>105.76599999999985</c:v>
-                </c:pt>
-                <c:pt idx="179">
-                  <c:v>105.89100000000187</c:v>
-                </c:pt>
-                <c:pt idx="180">
-                  <c:v>105.99999999999419</c:v>
-                </c:pt>
-                <c:pt idx="181">
-                  <c:v>106.1089999999961</c:v>
-                </c:pt>
-                <c:pt idx="182">
-                  <c:v>106.21900000000402</c:v>
-                </c:pt>
-                <c:pt idx="183">
-                  <c:v>106.32799999999634</c:v>
-                </c:pt>
-                <c:pt idx="184">
-                  <c:v>106.45299999999835</c:v>
-                </c:pt>
-                <c:pt idx="185">
-                  <c:v>106.56200000000027</c:v>
-                </c:pt>
-                <c:pt idx="186">
-                  <c:v>106.67199999999859</c:v>
-                </c:pt>
-                <c:pt idx="187">
-                  <c:v>106.7810000000005</c:v>
-                </c:pt>
-                <c:pt idx="188">
-                  <c:v>106.89099999999883</c:v>
-                </c:pt>
-                <c:pt idx="189">
-                  <c:v>107.00000000000074</c:v>
-                </c:pt>
-                <c:pt idx="190">
-                  <c:v>107.12499999999316</c:v>
-                </c:pt>
-                <c:pt idx="191">
-                  <c:v>107.23399999999508</c:v>
-                </c:pt>
-                <c:pt idx="192">
-                  <c:v>107.3589999999971</c:v>
-                </c:pt>
-                <c:pt idx="193">
-                  <c:v>107.46900000000501</c:v>
-                </c:pt>
-                <c:pt idx="194">
-                  <c:v>107.59399999999744</c:v>
-                </c:pt>
-                <c:pt idx="195">
-                  <c:v>107.70299999999935</c:v>
-                </c:pt>
-                <c:pt idx="196">
-                  <c:v>107.81200000000126</c:v>
-                </c:pt>
-                <c:pt idx="197">
-                  <c:v>107.92199999999958</c:v>
-                </c:pt>
-                <c:pt idx="198">
-                  <c:v>108.0310000000015</c:v>
-                </c:pt>
-                <c:pt idx="199">
-                  <c:v>108.14099999999982</c:v>
-                </c:pt>
-                <c:pt idx="200">
-                  <c:v>108.25000000000173</c:v>
-                </c:pt>
-                <c:pt idx="201">
-                  <c:v>108.37499999999416</c:v>
-                </c:pt>
-                <c:pt idx="202">
-                  <c:v>108.49999999999618</c:v>
-                </c:pt>
-                <c:pt idx="203">
-                  <c:v>108.60899999999809</c:v>
-                </c:pt>
-                <c:pt idx="204">
-                  <c:v>108.71899999999641</c:v>
-                </c:pt>
-                <c:pt idx="205">
-                  <c:v>108.82799999999833</c:v>
-                </c:pt>
-                <c:pt idx="206">
-                  <c:v>108.95300000000034</c:v>
-                </c:pt>
-                <c:pt idx="207">
-                  <c:v>109.06200000000226</c:v>
-                </c:pt>
-                <c:pt idx="208">
-                  <c:v>109.17200000000058</c:v>
-                </c:pt>
-                <c:pt idx="209">
-                  <c:v>109.28100000000249</c:v>
-                </c:pt>
-                <c:pt idx="210">
-                  <c:v>109.39100000000082</c:v>
-                </c:pt>
-                <c:pt idx="211">
-                  <c:v>109.51599999999324</c:v>
-                </c:pt>
-                <c:pt idx="212">
-                  <c:v>109.62499999999515</c:v>
-                </c:pt>
-                <c:pt idx="213">
-                  <c:v>109.73399999999707</c:v>
-                </c:pt>
-                <c:pt idx="214">
-                  <c:v>109.84400000000498</c:v>
-                </c:pt>
-                <c:pt idx="215">
-                  <c:v>109.9529999999973</c:v>
-                </c:pt>
-                <c:pt idx="216">
-                  <c:v>110.06199999999922</c:v>
-                </c:pt>
-                <c:pt idx="217">
-                  <c:v>110.18700000000123</c:v>
-                </c:pt>
-              </c:numCache>
-            </c:numRef>
-          </c:xVal>
-          <c:yVal>
-            <c:numRef>
-              <c:f>'WELD DATA (2)'!$Y$2:$Y$2211</c:f>
-              <c:numCache>
-                <c:formatCode>0.0000</c:formatCode>
-                <c:ptCount val="218"/>
-                <c:pt idx="0">
-                  <c:v>477.91019999999997</c:v>
-                </c:pt>
-                <c:pt idx="1">
-                  <c:v>477.91019999999997</c:v>
-                </c:pt>
-                <c:pt idx="2">
-                  <c:v>478.32490000000001</c:v>
-                </c:pt>
-                <c:pt idx="3">
-                  <c:v>478.34840000000003</c:v>
-                </c:pt>
-                <c:pt idx="4">
-                  <c:v>478.34899999999999</c:v>
-                </c:pt>
-                <c:pt idx="5">
-                  <c:v>478.34899999999999</c:v>
-                </c:pt>
-                <c:pt idx="6">
-                  <c:v>478.34899999999999</c:v>
-                </c:pt>
-                <c:pt idx="7">
-                  <c:v>478.34899999999999</c:v>
-                </c:pt>
-                <c:pt idx="8">
-                  <c:v>478.5915</c:v>
-                </c:pt>
-                <c:pt idx="9">
-                  <c:v>479.21319999999997</c:v>
-                </c:pt>
-                <c:pt idx="10">
-                  <c:v>479.22629999999998</c:v>
-                </c:pt>
-                <c:pt idx="11">
-                  <c:v>479.22629999999998</c:v>
-                </c:pt>
-                <c:pt idx="12">
-                  <c:v>479.58769999999998</c:v>
-                </c:pt>
-                <c:pt idx="13">
-                  <c:v>479.6635</c:v>
-                </c:pt>
-                <c:pt idx="14">
-                  <c:v>479.66539999999998</c:v>
-                </c:pt>
-                <c:pt idx="15">
-                  <c:v>479.96850000000001</c:v>
-                </c:pt>
-                <c:pt idx="16">
-                  <c:v>480.10300000000001</c:v>
-                </c:pt>
-                <c:pt idx="17">
-                  <c:v>480.10419999999999</c:v>
-                </c:pt>
-                <c:pt idx="18">
-                  <c:v>480.10419999999999</c:v>
-                </c:pt>
-                <c:pt idx="19">
-                  <c:v>480.48930000000001</c:v>
-                </c:pt>
-                <c:pt idx="20">
-                  <c:v>480.54230000000001</c:v>
-                </c:pt>
-                <c:pt idx="21">
-                  <c:v>480.54300000000001</c:v>
-                </c:pt>
-                <c:pt idx="22">
-                  <c:v>480.54300000000001</c:v>
-                </c:pt>
-                <c:pt idx="23">
-                  <c:v>480.54300000000001</c:v>
-                </c:pt>
-                <c:pt idx="24">
-                  <c:v>480.54300000000001</c:v>
-                </c:pt>
-                <c:pt idx="25">
-                  <c:v>480.54300000000001</c:v>
-                </c:pt>
-                <c:pt idx="26">
-                  <c:v>480.54300000000001</c:v>
-                </c:pt>
-                <c:pt idx="27">
-                  <c:v>480.54300000000001</c:v>
-                </c:pt>
-                <c:pt idx="28">
-                  <c:v>480.54300000000001</c:v>
-                </c:pt>
-                <c:pt idx="29">
-                  <c:v>480.13470000000001</c:v>
-                </c:pt>
-                <c:pt idx="30">
-                  <c:v>480.13470000000001</c:v>
-                </c:pt>
-                <c:pt idx="31">
-                  <c:v>480.10489999999999</c:v>
-                </c:pt>
-                <c:pt idx="32">
-                  <c:v>480.10419999999999</c:v>
-                </c:pt>
-                <c:pt idx="33">
-                  <c:v>479.673</c:v>
-                </c:pt>
-                <c:pt idx="34">
-                  <c:v>479.66550000000001</c:v>
-                </c:pt>
-                <c:pt idx="35">
-                  <c:v>479.48680000000002</c:v>
-                </c:pt>
-                <c:pt idx="36">
-                  <c:v>479.48680000000002</c:v>
-                </c:pt>
-                <c:pt idx="37">
-                  <c:v>479.23</c:v>
-                </c:pt>
-                <c:pt idx="38">
-                  <c:v>479.22660000000002</c:v>
-                </c:pt>
-                <c:pt idx="39">
-                  <c:v>479.22660000000002</c:v>
-                </c:pt>
-                <c:pt idx="40">
-                  <c:v>478.3972</c:v>
-                </c:pt>
-                <c:pt idx="41">
-                  <c:v>478.3972</c:v>
-                </c:pt>
-                <c:pt idx="42">
-                  <c:v>478.34899999999999</c:v>
-                </c:pt>
-                <c:pt idx="43">
-                  <c:v>477.50540000000001</c:v>
-                </c:pt>
-                <c:pt idx="44">
-                  <c:v>477.47219999999999</c:v>
-                </c:pt>
-                <c:pt idx="45">
-                  <c:v>477.47140000000002</c:v>
-                </c:pt>
-                <c:pt idx="46">
-                  <c:v>477.47140000000002</c:v>
-                </c:pt>
-                <c:pt idx="47">
-                  <c:v>477.0462</c:v>
-                </c:pt>
-                <c:pt idx="48">
-                  <c:v>477.03309999999999</c:v>
-                </c:pt>
-                <c:pt idx="49">
-                  <c:v>477.0326</c:v>
-                </c:pt>
-                <c:pt idx="50">
-                  <c:v>477.0326</c:v>
-                </c:pt>
-                <c:pt idx="51">
-                  <c:v>477.0326</c:v>
-                </c:pt>
-                <c:pt idx="52">
-                  <c:v>477.0326</c:v>
-                </c:pt>
-                <c:pt idx="53">
-                  <c:v>477.0326</c:v>
-                </c:pt>
-                <c:pt idx="54">
-                  <c:v>477.0326</c:v>
-                </c:pt>
-                <c:pt idx="55">
-                  <c:v>477.0326</c:v>
-                </c:pt>
-                <c:pt idx="56">
-                  <c:v>477.0326</c:v>
-                </c:pt>
-                <c:pt idx="57">
-                  <c:v>477.0326</c:v>
-                </c:pt>
-                <c:pt idx="58">
-                  <c:v>477.0326</c:v>
-                </c:pt>
-                <c:pt idx="59">
-                  <c:v>477.0326</c:v>
-                </c:pt>
-                <c:pt idx="60">
-                  <c:v>477.0326</c:v>
-                </c:pt>
-                <c:pt idx="61">
-                  <c:v>477.88319999999999</c:v>
-                </c:pt>
-                <c:pt idx="62">
-                  <c:v>477.90960000000001</c:v>
-                </c:pt>
-                <c:pt idx="63">
-                  <c:v>477.91019999999997</c:v>
-                </c:pt>
-                <c:pt idx="64">
-                  <c:v>478.33539999999999</c:v>
-                </c:pt>
-                <c:pt idx="65">
-                  <c:v>478.33539999999999</c:v>
-                </c:pt>
-                <c:pt idx="66">
-                  <c:v>478.34890000000001</c:v>
-                </c:pt>
-                <c:pt idx="67">
-                  <c:v>479.10559999999998</c:v>
-                </c:pt>
-                <c:pt idx="68">
-                  <c:v>479.22390000000001</c:v>
-                </c:pt>
-                <c:pt idx="69">
-                  <c:v>479.22660000000002</c:v>
-                </c:pt>
-                <c:pt idx="70">
-                  <c:v>479.22660000000002</c:v>
-                </c:pt>
-                <c:pt idx="71">
-                  <c:v>480.05599999999998</c:v>
-                </c:pt>
-                <c:pt idx="72">
-                  <c:v>480.10359999999997</c:v>
-                </c:pt>
-                <c:pt idx="73">
-                  <c:v>480.19880000000001</c:v>
-                </c:pt>
-                <c:pt idx="74">
-                  <c:v>480.19880000000001</c:v>
-                </c:pt>
-                <c:pt idx="75">
-                  <c:v>480.53449999999998</c:v>
-                </c:pt>
-                <c:pt idx="76">
-                  <c:v>480.5428</c:v>
-                </c:pt>
-                <c:pt idx="77">
-                  <c:v>480.5428</c:v>
-                </c:pt>
-                <c:pt idx="78">
-                  <c:v>481.41309999999999</c:v>
-                </c:pt>
-                <c:pt idx="79">
-                  <c:v>481.42059999999998</c:v>
-                </c:pt>
-                <c:pt idx="80">
-                  <c:v>481.42059999999998</c:v>
-                </c:pt>
-                <c:pt idx="81">
-                  <c:v>481.73669999999998</c:v>
-                </c:pt>
-                <c:pt idx="82">
-                  <c:v>481.73669999999998</c:v>
-                </c:pt>
-                <c:pt idx="83">
-                  <c:v>481.85879999999997</c:v>
-                </c:pt>
-                <c:pt idx="84">
-                  <c:v>481.85939999999999</c:v>
-                </c:pt>
-                <c:pt idx="85">
-                  <c:v>481.85939999999999</c:v>
-                </c:pt>
-                <c:pt idx="86">
-                  <c:v>481.85939999999999</c:v>
-                </c:pt>
-                <c:pt idx="87">
-                  <c:v>481.85939999999999</c:v>
-                </c:pt>
-                <c:pt idx="88">
-                  <c:v>481.85939999999999</c:v>
-                </c:pt>
-                <c:pt idx="89">
-                  <c:v>481.85939999999999</c:v>
-                </c:pt>
-                <c:pt idx="90">
-                  <c:v>481.85939999999999</c:v>
-                </c:pt>
-                <c:pt idx="91">
-                  <c:v>481.50839999999999</c:v>
-                </c:pt>
-                <c:pt idx="92">
-                  <c:v>481.50839999999999</c:v>
-                </c:pt>
-                <c:pt idx="93">
-                  <c:v>481.42250000000001</c:v>
-                </c:pt>
-                <c:pt idx="94">
-                  <c:v>481.42059999999998</c:v>
-                </c:pt>
-                <c:pt idx="95">
-                  <c:v>481.42059999999998</c:v>
-                </c:pt>
-                <c:pt idx="96">
-                  <c:v>480.54360000000003</c:v>
-                </c:pt>
-                <c:pt idx="97">
-                  <c:v>480.54300000000001</c:v>
-                </c:pt>
-                <c:pt idx="98">
-                  <c:v>480.54300000000001</c:v>
-                </c:pt>
-                <c:pt idx="99">
-                  <c:v>480.11500000000001</c:v>
-                </c:pt>
-                <c:pt idx="100">
-                  <c:v>480.11500000000001</c:v>
-                </c:pt>
-                <c:pt idx="101">
-                  <c:v>480.10419999999999</c:v>
-                </c:pt>
-                <c:pt idx="102">
-                  <c:v>479.27480000000003</c:v>
-                </c:pt>
-                <c:pt idx="103">
-                  <c:v>479.27480000000003</c:v>
-                </c:pt>
-                <c:pt idx="104">
-                  <c:v>479.22719999999998</c:v>
-                </c:pt>
-                <c:pt idx="105">
-                  <c:v>479.03750000000002</c:v>
-                </c:pt>
-                <c:pt idx="106">
-                  <c:v>478.36599999999999</c:v>
-                </c:pt>
-                <c:pt idx="107">
-                  <c:v>478.3492</c:v>
-                </c:pt>
-                <c:pt idx="108">
-                  <c:v>477.74279999999999</c:v>
-                </c:pt>
-                <c:pt idx="109">
-                  <c:v>477.74279999999999</c:v>
-                </c:pt>
-                <c:pt idx="110">
-                  <c:v>477.47379999999998</c:v>
-                </c:pt>
-                <c:pt idx="111">
-                  <c:v>477.47149999999999</c:v>
-                </c:pt>
-                <c:pt idx="112">
-                  <c:v>476.79129999999998</c:v>
-                </c:pt>
-                <c:pt idx="113">
-                  <c:v>476.59539999999998</c:v>
-                </c:pt>
-                <c:pt idx="114">
-                  <c:v>476.59539999999998</c:v>
-                </c:pt>
-                <c:pt idx="115">
-                  <c:v>476.59379999999999</c:v>
-                </c:pt>
-                <c:pt idx="116">
-                  <c:v>476.59379999999999</c:v>
-                </c:pt>
-                <c:pt idx="117">
-                  <c:v>476.59379999999999</c:v>
-                </c:pt>
-                <c:pt idx="118">
-                  <c:v>476.59379999999999</c:v>
-                </c:pt>
-                <c:pt idx="119">
-                  <c:v>476.44459999999998</c:v>
-                </c:pt>
-                <c:pt idx="120">
-                  <c:v>476.15929999999997</c:v>
-                </c:pt>
-                <c:pt idx="121">
-                  <c:v>476.15499999999997</c:v>
-                </c:pt>
-                <c:pt idx="122">
-                  <c:v>476.47109999999998</c:v>
-                </c:pt>
-                <c:pt idx="123">
-                  <c:v>476.47109999999998</c:v>
-                </c:pt>
-                <c:pt idx="124">
-                  <c:v>476.59109999999998</c:v>
-                </c:pt>
-                <c:pt idx="125">
-                  <c:v>476.59379999999999</c:v>
-                </c:pt>
-                <c:pt idx="126">
-                  <c:v>476.95499999999998</c:v>
-                </c:pt>
-                <c:pt idx="127">
-                  <c:v>477.03149999999999</c:v>
-                </c:pt>
-                <c:pt idx="128">
-                  <c:v>477.03149999999999</c:v>
-                </c:pt>
-                <c:pt idx="129">
-                  <c:v>477.0326</c:v>
-                </c:pt>
-                <c:pt idx="130">
-                  <c:v>477.45229999999998</c:v>
-                </c:pt>
-                <c:pt idx="131">
-                  <c:v>477.47089999999997</c:v>
-                </c:pt>
-                <c:pt idx="132">
-                  <c:v>477.54059999999998</c:v>
-                </c:pt>
-                <c:pt idx="133">
-                  <c:v>477.89940000000001</c:v>
-                </c:pt>
-                <c:pt idx="134">
-                  <c:v>477.89940000000001</c:v>
-                </c:pt>
-                <c:pt idx="135">
-                  <c:v>477.91019999999997</c:v>
-                </c:pt>
-                <c:pt idx="136">
-                  <c:v>477.91019999999997</c:v>
-                </c:pt>
-                <c:pt idx="137">
-                  <c:v>478.30079999999998</c:v>
-                </c:pt>
-                <c:pt idx="138">
-                  <c:v>478.3485</c:v>
-                </c:pt>
-                <c:pt idx="139">
-                  <c:v>478.3485</c:v>
-                </c:pt>
-                <c:pt idx="140">
-                  <c:v>479.21910000000003</c:v>
-                </c:pt>
-                <c:pt idx="141">
-                  <c:v>479.21910000000003</c:v>
-                </c:pt>
-                <c:pt idx="142">
-                  <c:v>479.22660000000002</c:v>
-                </c:pt>
-                <c:pt idx="143">
-                  <c:v>479.22660000000002</c:v>
-                </c:pt>
-                <c:pt idx="144">
-                  <c:v>479.6463</c:v>
-                </c:pt>
-                <c:pt idx="145">
-                  <c:v>479.66520000000003</c:v>
-                </c:pt>
-                <c:pt idx="146">
-                  <c:v>479.66539999999998</c:v>
-                </c:pt>
-                <c:pt idx="147">
-                  <c:v>479.66539999999998</c:v>
-                </c:pt>
-                <c:pt idx="148">
-                  <c:v>480.52600000000001</c:v>
-                </c:pt>
-                <c:pt idx="149">
-                  <c:v>480.54289999999997</c:v>
-                </c:pt>
-                <c:pt idx="150">
-                  <c:v>480.92129999999997</c:v>
-                </c:pt>
-                <c:pt idx="151">
-                  <c:v>480.98020000000002</c:v>
-                </c:pt>
-                <c:pt idx="152">
-                  <c:v>480.98020000000002</c:v>
-                </c:pt>
-                <c:pt idx="153">
-                  <c:v>480.98180000000002</c:v>
-                </c:pt>
-                <c:pt idx="154">
-                  <c:v>481.40159999999997</c:v>
-                </c:pt>
-                <c:pt idx="155">
-                  <c:v>481.40159999999997</c:v>
-                </c:pt>
-                <c:pt idx="156">
-                  <c:v>481.4203</c:v>
-                </c:pt>
-                <c:pt idx="157">
-                  <c:v>481.42059999999998</c:v>
-                </c:pt>
-                <c:pt idx="158">
-                  <c:v>481.42059999999998</c:v>
-                </c:pt>
-                <c:pt idx="159">
-                  <c:v>481.42059999999998</c:v>
-                </c:pt>
-                <c:pt idx="160">
-                  <c:v>481.42059999999998</c:v>
-                </c:pt>
-                <c:pt idx="161">
-                  <c:v>481.42059999999998</c:v>
-                </c:pt>
-                <c:pt idx="162">
-                  <c:v>481.42059999999998</c:v>
-                </c:pt>
-                <c:pt idx="163">
-                  <c:v>481.42059999999998</c:v>
-                </c:pt>
-                <c:pt idx="164">
-                  <c:v>481.21109999999999</c:v>
-                </c:pt>
-                <c:pt idx="165">
-                  <c:v>481.21109999999999</c:v>
-                </c:pt>
-                <c:pt idx="166">
-                  <c:v>480.98340000000002</c:v>
-                </c:pt>
-                <c:pt idx="167">
-                  <c:v>480.98180000000002</c:v>
-                </c:pt>
-                <c:pt idx="168">
-                  <c:v>480.6207</c:v>
-                </c:pt>
-                <c:pt idx="169">
-                  <c:v>480.54349999999999</c:v>
-                </c:pt>
-                <c:pt idx="170">
-                  <c:v>480.54300000000001</c:v>
-                </c:pt>
-                <c:pt idx="171">
-                  <c:v>480.54300000000001</c:v>
-                </c:pt>
-                <c:pt idx="172">
-                  <c:v>480.11270000000002</c:v>
-                </c:pt>
-                <c:pt idx="173">
-                  <c:v>480.1044</c:v>
-                </c:pt>
-                <c:pt idx="174">
-                  <c:v>480.1044</c:v>
-                </c:pt>
-                <c:pt idx="175">
-                  <c:v>479.78809999999999</c:v>
-                </c:pt>
-                <c:pt idx="176">
-                  <c:v>479.66730000000001</c:v>
-                </c:pt>
-                <c:pt idx="177">
-                  <c:v>479.66539999999998</c:v>
-                </c:pt>
-                <c:pt idx="178">
-                  <c:v>479.26510000000002</c:v>
-                </c:pt>
-                <c:pt idx="179">
-                  <c:v>479.22719999999998</c:v>
-                </c:pt>
-                <c:pt idx="180">
-                  <c:v>479.22719999999998</c:v>
-                </c:pt>
-                <c:pt idx="181">
-                  <c:v>479.22660000000002</c:v>
-                </c:pt>
-                <c:pt idx="182">
-                  <c:v>478.80689999999998</c:v>
-                </c:pt>
-                <c:pt idx="183">
-                  <c:v>478.78840000000002</c:v>
-                </c:pt>
-                <c:pt idx="184">
-                  <c:v>478.78840000000002</c:v>
-                </c:pt>
-                <c:pt idx="185">
-                  <c:v>478.7878</c:v>
-                </c:pt>
-                <c:pt idx="186">
-                  <c:v>478.37619999999998</c:v>
-                </c:pt>
-                <c:pt idx="187">
-                  <c:v>478.34910000000002</c:v>
-                </c:pt>
-                <c:pt idx="188">
-                  <c:v>478.34899999999999</c:v>
-                </c:pt>
-                <c:pt idx="189">
-                  <c:v>478.34899999999999</c:v>
-                </c:pt>
-                <c:pt idx="190">
-                  <c:v>478.34899999999999</c:v>
-                </c:pt>
-                <c:pt idx="191">
-                  <c:v>478.34899999999999</c:v>
-                </c:pt>
-                <c:pt idx="192">
-                  <c:v>478.34899999999999</c:v>
-                </c:pt>
-                <c:pt idx="193">
-                  <c:v>478.34899999999999</c:v>
-                </c:pt>
-                <c:pt idx="194">
-                  <c:v>478.34899999999999</c:v>
-                </c:pt>
-                <c:pt idx="195">
-                  <c:v>478.34899999999999</c:v>
-                </c:pt>
-                <c:pt idx="196">
-                  <c:v>478.34899999999999</c:v>
-                </c:pt>
-                <c:pt idx="197">
-                  <c:v>478.34899999999999</c:v>
-                </c:pt>
-                <c:pt idx="198">
-                  <c:v>478.34899999999999</c:v>
-                </c:pt>
-                <c:pt idx="199">
-                  <c:v>478.55849999999998</c:v>
-                </c:pt>
-                <c:pt idx="200">
-                  <c:v>478.78590000000003</c:v>
-                </c:pt>
-                <c:pt idx="201">
-                  <c:v>478.7878</c:v>
-                </c:pt>
-                <c:pt idx="202">
-                  <c:v>478.7878</c:v>
-                </c:pt>
-                <c:pt idx="203">
-                  <c:v>479.92259999999999</c:v>
-                </c:pt>
-                <c:pt idx="204">
-                  <c:v>480.10129999999998</c:v>
-                </c:pt>
-                <c:pt idx="205">
-                  <c:v>480.10419999999999</c:v>
-                </c:pt>
-                <c:pt idx="206">
-                  <c:v>480.92759999999998</c:v>
-                </c:pt>
-                <c:pt idx="207">
-                  <c:v>480.98039999999997</c:v>
-                </c:pt>
-                <c:pt idx="208">
-                  <c:v>480.98039999999997</c:v>
-                </c:pt>
-                <c:pt idx="209">
-                  <c:v>480.98180000000002</c:v>
-                </c:pt>
-                <c:pt idx="210">
-                  <c:v>481.82909999999998</c:v>
-                </c:pt>
-                <c:pt idx="211">
-                  <c:v>481.8587</c:v>
-                </c:pt>
-                <c:pt idx="212">
-                  <c:v>481.92520000000002</c:v>
-                </c:pt>
-                <c:pt idx="213">
-                  <c:v>483.1397</c:v>
-                </c:pt>
-                <c:pt idx="214">
-                  <c:v>483.17529999999999</c:v>
-                </c:pt>
-                <c:pt idx="215">
-                  <c:v>483.17529999999999</c:v>
-                </c:pt>
-                <c:pt idx="216">
-                  <c:v>483.245</c:v>
-                </c:pt>
-                <c:pt idx="217">
-                  <c:v>483.60930000000002</c:v>
-                </c:pt>
-              </c:numCache>
-            </c:numRef>
-          </c:yVal>
-          <c:smooth val="1"/>
-          <c:extLst>
-            <c:ext xmlns:c16="http://schemas.microsoft.com/office/drawing/2014/chart" uri="{C3380CC4-5D6E-409C-BE32-E72D297353CC}">
-              <c16:uniqueId val="{00000000-1916-4280-8861-1324C38776F2}"/>
-            </c:ext>
-          </c:extLst>
-        </c:ser>
-        <c:dLbls>
-          <c:showLegendKey val="0"/>
-          <c:showVal val="0"/>
-          <c:showCatName val="0"/>
-          <c:showSerName val="0"/>
-          <c:showPercent val="0"/>
-          <c:showBubbleSize val="0"/>
-        </c:dLbls>
-        <c:axId val="55147904"/>
-        <c:axId val="58872960"/>
-      </c:scatterChart>
-      <c:scatterChart>
-        <c:scatterStyle val="smoothMarker"/>
-        <c:varyColors val="0"/>
-        <c:ser>
-          <c:idx val="1"/>
-          <c:order val="1"/>
-          <c:tx>
-            <c:strRef>
-              <c:f>'WELD DATA (2)'!$BV$1</c:f>
-              <c:strCache>
-                <c:ptCount val="1"/>
-                <c:pt idx="0">
-                  <c:v>THRM_POWERCMD</c:v>
-                </c:pt>
-              </c:strCache>
-            </c:strRef>
-          </c:tx>
-          <c:marker>
-            <c:symbol val="none"/>
-          </c:marker>
-          <c:xVal>
-            <c:numRef>
-              <c:f>'WELD DATA (2)'!$C$2:$C$2211</c:f>
-              <c:numCache>
-                <c:formatCode>0.00</c:formatCode>
-                <c:ptCount val="218"/>
-                <c:pt idx="0">
-                  <c:v>85.686999999999003</c:v>
-                </c:pt>
-                <c:pt idx="1">
-                  <c:v>85.796999999997325</c:v>
-                </c:pt>
-                <c:pt idx="2">
-                  <c:v>85.905999999999239</c:v>
-                </c:pt>
-                <c:pt idx="3">
-                  <c:v>86.015999999997561</c:v>
-                </c:pt>
-                <c:pt idx="4">
-                  <c:v>86.140999999999579</c:v>
-                </c:pt>
-                <c:pt idx="5">
-                  <c:v>86.250000000001492</c:v>
-                </c:pt>
-                <c:pt idx="6">
-                  <c:v>86.359000000003405</c:v>
-                </c:pt>
-                <c:pt idx="7">
-                  <c:v>86.469000000001728</c:v>
-                </c:pt>
-                <c:pt idx="8">
-                  <c:v>86.577999999994049</c:v>
-                </c:pt>
-                <c:pt idx="9">
-                  <c:v>86.686999999995962</c:v>
-                </c:pt>
-                <c:pt idx="10">
-                  <c:v>86.81199999999798</c:v>
-                </c:pt>
-                <c:pt idx="11">
-                  <c:v>86.936999999999998</c:v>
-                </c:pt>
-                <c:pt idx="12">
-                  <c:v>87.04699999999832</c:v>
-                </c:pt>
-                <c:pt idx="13">
-                  <c:v>87.172000000000338</c:v>
-                </c:pt>
-                <c:pt idx="14">
-                  <c:v>87.281000000002251</c:v>
-                </c:pt>
-                <c:pt idx="15">
-                  <c:v>87.391000000000574</c:v>
-                </c:pt>
-                <c:pt idx="16">
-                  <c:v>87.500000000002487</c:v>
-                </c:pt>
-                <c:pt idx="17">
-                  <c:v>87.625000000004505</c:v>
-                </c:pt>
-                <c:pt idx="18">
-                  <c:v>87.733999999996826</c:v>
-                </c:pt>
-                <c:pt idx="19">
-                  <c:v>87.843999999995148</c:v>
-                </c:pt>
-                <c:pt idx="20">
-                  <c:v>87.952999999997061</c:v>
-                </c:pt>
-                <c:pt idx="21">
-                  <c:v>88.077999999999079</c:v>
-                </c:pt>
-                <c:pt idx="22">
-                  <c:v>88.187000000000992</c:v>
-                </c:pt>
-                <c:pt idx="23">
-                  <c:v>88.296999999999315</c:v>
-                </c:pt>
-                <c:pt idx="24">
-                  <c:v>88.406000000001228</c:v>
-                </c:pt>
-                <c:pt idx="25">
-                  <c:v>88.515999999999551</c:v>
-                </c:pt>
-                <c:pt idx="26">
-                  <c:v>88.641000000001569</c:v>
-                </c:pt>
-                <c:pt idx="27">
-                  <c:v>88.750000000003482</c:v>
-                </c:pt>
-                <c:pt idx="28">
-                  <c:v>88.859000000005395</c:v>
-                </c:pt>
-                <c:pt idx="29">
-                  <c:v>88.98399999999782</c:v>
-                </c:pt>
-                <c:pt idx="30">
-                  <c:v>89.093999999996143</c:v>
-                </c:pt>
-                <c:pt idx="31">
-                  <c:v>89.202999999998056</c:v>
-                </c:pt>
-                <c:pt idx="32">
-                  <c:v>89.311999999999969</c:v>
-                </c:pt>
-                <c:pt idx="33">
-                  <c:v>89.421999999998292</c:v>
-                </c:pt>
-                <c:pt idx="34">
-                  <c:v>89.531000000000205</c:v>
-                </c:pt>
-                <c:pt idx="35">
-                  <c:v>89.656000000002223</c:v>
-                </c:pt>
-                <c:pt idx="36">
-                  <c:v>89.766000000000545</c:v>
-                </c:pt>
-                <c:pt idx="37">
-                  <c:v>89.875000000002458</c:v>
-                </c:pt>
-                <c:pt idx="38">
-                  <c:v>89.984000000004372</c:v>
-                </c:pt>
-                <c:pt idx="39">
-                  <c:v>90.108999999996797</c:v>
-                </c:pt>
-                <c:pt idx="40">
-                  <c:v>90.21899999999512</c:v>
-                </c:pt>
-                <c:pt idx="41">
-                  <c:v>90.327999999997033</c:v>
-                </c:pt>
-                <c:pt idx="42">
-                  <c:v>90.436999999998946</c:v>
-                </c:pt>
-                <c:pt idx="43">
-                  <c:v>90.546999999997269</c:v>
-                </c:pt>
-                <c:pt idx="44">
-                  <c:v>90.671999999999287</c:v>
-                </c:pt>
-                <c:pt idx="45">
-                  <c:v>90.7810000000012</c:v>
-                </c:pt>
-                <c:pt idx="46">
-                  <c:v>90.890999999999522</c:v>
-                </c:pt>
-                <c:pt idx="47">
-                  <c:v>91.000000000001435</c:v>
-                </c:pt>
-                <c:pt idx="48">
-                  <c:v>91.109000000003348</c:v>
-                </c:pt>
-                <c:pt idx="49">
-                  <c:v>91.234000000005366</c:v>
-                </c:pt>
-                <c:pt idx="50">
-                  <c:v>91.343999999994097</c:v>
-                </c:pt>
-                <c:pt idx="51">
-                  <c:v>91.45299999999601</c:v>
-                </c:pt>
-                <c:pt idx="52">
-                  <c:v>91.561999999997923</c:v>
-                </c:pt>
-                <c:pt idx="53">
-                  <c:v>91.686999999999941</c:v>
-                </c:pt>
-                <c:pt idx="54">
-                  <c:v>91.796999999998263</c:v>
-                </c:pt>
-                <c:pt idx="55">
-                  <c:v>91.906000000000176</c:v>
-                </c:pt>
-                <c:pt idx="56">
-                  <c:v>92.015999999998499</c:v>
-                </c:pt>
-                <c:pt idx="57">
-                  <c:v>92.125000000000412</c:v>
-                </c:pt>
-                <c:pt idx="58">
-                  <c:v>92.25000000000243</c:v>
-                </c:pt>
-                <c:pt idx="59">
-                  <c:v>92.359000000004343</c:v>
-                </c:pt>
-                <c:pt idx="60">
-                  <c:v>92.468999999993073</c:v>
-                </c:pt>
-                <c:pt idx="61">
-                  <c:v>92.577999999994987</c:v>
-                </c:pt>
-                <c:pt idx="62">
-                  <c:v>92.6869999999969</c:v>
-                </c:pt>
-                <c:pt idx="63">
-                  <c:v>92.797000000004815</c:v>
-                </c:pt>
-                <c:pt idx="64">
-                  <c:v>92.92199999999724</c:v>
-                </c:pt>
-                <c:pt idx="65">
-                  <c:v>93.030999999999153</c:v>
-                </c:pt>
-                <c:pt idx="66">
-                  <c:v>93.140999999997476</c:v>
-                </c:pt>
-                <c:pt idx="67">
-                  <c:v>93.265999999999494</c:v>
-                </c:pt>
-                <c:pt idx="68">
-                  <c:v>93.375000000001407</c:v>
-                </c:pt>
-                <c:pt idx="69">
-                  <c:v>93.48400000000332</c:v>
-                </c:pt>
-                <c:pt idx="70">
-                  <c:v>93.594000000001643</c:v>
-                </c:pt>
-                <c:pt idx="71">
-                  <c:v>93.702999999993963</c:v>
-                </c:pt>
-                <c:pt idx="72">
-                  <c:v>93.811999999995876</c:v>
-                </c:pt>
-                <c:pt idx="73">
-                  <c:v>93.922000000003791</c:v>
-                </c:pt>
-                <c:pt idx="74">
-                  <c:v>94.047000000005809</c:v>
-                </c:pt>
-                <c:pt idx="75">
-                  <c:v>94.15599999999813</c:v>
-                </c:pt>
-                <c:pt idx="76">
-                  <c:v>94.281000000000148</c:v>
-                </c:pt>
-                <c:pt idx="77">
-                  <c:v>94.390999999998471</c:v>
-                </c:pt>
-                <c:pt idx="78">
-                  <c:v>94.500000000000384</c:v>
-                </c:pt>
-                <c:pt idx="79">
-                  <c:v>94.609000000002297</c:v>
-                </c:pt>
-                <c:pt idx="80">
-                  <c:v>94.719000000000619</c:v>
-                </c:pt>
-                <c:pt idx="81">
-                  <c:v>94.828000000002532</c:v>
-                </c:pt>
-                <c:pt idx="82">
-                  <c:v>94.936999999994853</c:v>
-                </c:pt>
-                <c:pt idx="83">
-                  <c:v>95.061999999996871</c:v>
-                </c:pt>
-                <c:pt idx="84">
-                  <c:v>95.172000000004786</c:v>
-                </c:pt>
-                <c:pt idx="85">
-                  <c:v>95.280999999997107</c:v>
-                </c:pt>
-                <c:pt idx="86">
-                  <c:v>95.390999999995429</c:v>
-                </c:pt>
-                <c:pt idx="87">
-                  <c:v>95.499999999997343</c:v>
-                </c:pt>
-                <c:pt idx="88">
-                  <c:v>95.608999999999256</c:v>
-                </c:pt>
-                <c:pt idx="89">
-                  <c:v>95.718999999997578</c:v>
-                </c:pt>
-                <c:pt idx="90">
-                  <c:v>95.843999999999596</c:v>
-                </c:pt>
-                <c:pt idx="91">
-                  <c:v>95.953000000001509</c:v>
-                </c:pt>
-                <c:pt idx="92">
-                  <c:v>96.077999999993935</c:v>
-                </c:pt>
-                <c:pt idx="93">
-                  <c:v>96.186999999995848</c:v>
-                </c:pt>
-                <c:pt idx="94">
-                  <c:v>96.311999999997866</c:v>
-                </c:pt>
-                <c:pt idx="95">
-                  <c:v>96.422000000005781</c:v>
-                </c:pt>
-                <c:pt idx="96">
-                  <c:v>96.530999999998102</c:v>
-                </c:pt>
-                <c:pt idx="97">
-                  <c:v>96.640999999996424</c:v>
-                </c:pt>
-                <c:pt idx="98">
-                  <c:v>96.749999999998337</c:v>
-                </c:pt>
-                <c:pt idx="99">
-                  <c:v>96.85900000000025</c:v>
-                </c:pt>
-                <c:pt idx="100">
-                  <c:v>96.968999999998573</c:v>
-                </c:pt>
-                <c:pt idx="101">
-                  <c:v>97.094000000000591</c:v>
-                </c:pt>
-                <c:pt idx="102">
-                  <c:v>97.203000000002504</c:v>
-                </c:pt>
-                <c:pt idx="103">
-                  <c:v>97.311999999994825</c:v>
-                </c:pt>
-                <c:pt idx="104">
-                  <c:v>97.436999999996843</c:v>
-                </c:pt>
-                <c:pt idx="105">
-                  <c:v>97.547000000004758</c:v>
-                </c:pt>
-                <c:pt idx="106">
-                  <c:v>97.655999999997078</c:v>
-                </c:pt>
-                <c:pt idx="107">
-                  <c:v>97.765999999995401</c:v>
-                </c:pt>
-                <c:pt idx="108">
-                  <c:v>97.874999999997314</c:v>
-                </c:pt>
-                <c:pt idx="109">
-                  <c:v>97.983999999999227</c:v>
-                </c:pt>
-                <c:pt idx="110">
-                  <c:v>98.109000000001245</c:v>
-                </c:pt>
-                <c:pt idx="111">
-                  <c:v>98.218999999999568</c:v>
-                </c:pt>
-                <c:pt idx="112">
-                  <c:v>98.344000000001586</c:v>
-                </c:pt>
-                <c:pt idx="113">
-                  <c:v>98.452999999993906</c:v>
-                </c:pt>
-                <c:pt idx="114">
-                  <c:v>98.56199999999582</c:v>
-                </c:pt>
-                <c:pt idx="115">
-                  <c:v>98.672000000003734</c:v>
-                </c:pt>
-                <c:pt idx="116">
-                  <c:v>98.797000000005752</c:v>
-                </c:pt>
-                <c:pt idx="117">
-                  <c:v>98.905999999998073</c:v>
-                </c:pt>
-                <c:pt idx="118">
-                  <c:v>99.015999999996396</c:v>
-                </c:pt>
-                <c:pt idx="119">
-                  <c:v>99.124999999998309</c:v>
-                </c:pt>
-                <c:pt idx="120">
-                  <c:v>99.250000000000327</c:v>
-                </c:pt>
-                <c:pt idx="121">
-                  <c:v>99.35900000000224</c:v>
-                </c:pt>
-                <c:pt idx="122">
-                  <c:v>99.469000000000563</c:v>
-                </c:pt>
-                <c:pt idx="123">
-                  <c:v>99.578000000002476</c:v>
-                </c:pt>
-                <c:pt idx="124">
-                  <c:v>99.686999999994796</c:v>
-                </c:pt>
-                <c:pt idx="125">
-                  <c:v>99.811999999996814</c:v>
-                </c:pt>
-                <c:pt idx="126">
-                  <c:v>99.922000000004729</c:v>
-                </c:pt>
-                <c:pt idx="127">
-                  <c:v>100.03099999999705</c:v>
-                </c:pt>
-                <c:pt idx="128">
-                  <c:v>100.14099999999537</c:v>
-                </c:pt>
-                <c:pt idx="129">
-                  <c:v>100.26599999999739</c:v>
-                </c:pt>
-                <c:pt idx="130">
-                  <c:v>100.3749999999993</c:v>
-                </c:pt>
-                <c:pt idx="131">
-                  <c:v>100.48400000000122</c:v>
-                </c:pt>
-                <c:pt idx="132">
-                  <c:v>100.59399999999954</c:v>
-                </c:pt>
-                <c:pt idx="133">
-                  <c:v>100.70300000000145</c:v>
-                </c:pt>
-                <c:pt idx="134">
-                  <c:v>100.82799999999388</c:v>
-                </c:pt>
-                <c:pt idx="135">
-                  <c:v>100.93699999999579</c:v>
-                </c:pt>
-                <c:pt idx="136">
-                  <c:v>101.04700000000371</c:v>
-                </c:pt>
-                <c:pt idx="137">
-                  <c:v>101.15600000000562</c:v>
-                </c:pt>
-                <c:pt idx="138">
-                  <c:v>101.28099999999804</c:v>
-                </c:pt>
-                <c:pt idx="139">
-                  <c:v>101.39099999999637</c:v>
-                </c:pt>
-                <c:pt idx="140">
-                  <c:v>101.49999999999828</c:v>
-                </c:pt>
-                <c:pt idx="141">
-                  <c:v>101.60900000000019</c:v>
-                </c:pt>
-                <c:pt idx="142">
-                  <c:v>101.71899999999852</c:v>
-                </c:pt>
-                <c:pt idx="143">
-                  <c:v>101.84400000000053</c:v>
-                </c:pt>
-                <c:pt idx="144">
-                  <c:v>101.95300000000245</c:v>
-                </c:pt>
-                <c:pt idx="145">
-                  <c:v>102.06199999999477</c:v>
-                </c:pt>
-                <c:pt idx="146">
-                  <c:v>102.18699999999679</c:v>
-                </c:pt>
-                <c:pt idx="147">
-                  <c:v>102.2970000000047</c:v>
-                </c:pt>
-                <c:pt idx="148">
-                  <c:v>102.40599999999702</c:v>
-                </c:pt>
-                <c:pt idx="149">
-                  <c:v>102.51599999999534</c:v>
-                </c:pt>
-                <c:pt idx="150">
-                  <c:v>102.62499999999726</c:v>
-                </c:pt>
-                <c:pt idx="151">
-                  <c:v>102.73399999999917</c:v>
-                </c:pt>
-                <c:pt idx="152">
-                  <c:v>102.85900000000119</c:v>
-                </c:pt>
-                <c:pt idx="153">
-                  <c:v>102.96899999999951</c:v>
-                </c:pt>
-                <c:pt idx="154">
-                  <c:v>103.07800000000142</c:v>
-                </c:pt>
-                <c:pt idx="155">
-                  <c:v>103.18699999999374</c:v>
-                </c:pt>
-                <c:pt idx="156">
-                  <c:v>103.29700000000166</c:v>
-                </c:pt>
-                <c:pt idx="157">
-                  <c:v>103.42200000000368</c:v>
-                </c:pt>
-                <c:pt idx="158">
-                  <c:v>103.53100000000559</c:v>
-                </c:pt>
-                <c:pt idx="159">
-                  <c:v>103.64099999999432</c:v>
-                </c:pt>
-                <c:pt idx="160">
-                  <c:v>103.74999999999623</c:v>
-                </c:pt>
-                <c:pt idx="161">
-                  <c:v>103.85899999999815</c:v>
-                </c:pt>
-                <c:pt idx="162">
-                  <c:v>103.96899999999647</c:v>
-                </c:pt>
-                <c:pt idx="163">
-                  <c:v>104.09399999999849</c:v>
-                </c:pt>
-                <c:pt idx="164">
-                  <c:v>104.2030000000004</c:v>
-                </c:pt>
-                <c:pt idx="165">
-                  <c:v>104.31200000000231</c:v>
-                </c:pt>
-                <c:pt idx="166">
-                  <c:v>104.42200000000064</c:v>
-                </c:pt>
-                <c:pt idx="167">
-                  <c:v>104.54700000000265</c:v>
-                </c:pt>
-                <c:pt idx="168">
-                  <c:v>104.65600000000457</c:v>
-                </c:pt>
-                <c:pt idx="169">
-                  <c:v>104.7659999999933</c:v>
-                </c:pt>
-                <c:pt idx="170">
-                  <c:v>104.87499999999521</c:v>
-                </c:pt>
-                <c:pt idx="171">
-                  <c:v>104.98399999999712</c:v>
-                </c:pt>
-                <c:pt idx="172">
-                  <c:v>105.09400000000504</c:v>
-                </c:pt>
-                <c:pt idx="173">
-                  <c:v>105.20299999999736</c:v>
-                </c:pt>
-                <c:pt idx="174">
-                  <c:v>105.32799999999938</c:v>
-                </c:pt>
-                <c:pt idx="175">
-                  <c:v>105.43700000000129</c:v>
-                </c:pt>
-                <c:pt idx="176">
-                  <c:v>105.54699999999961</c:v>
-                </c:pt>
-                <c:pt idx="177">
-                  <c:v>105.65600000000153</c:v>
-                </c:pt>
-                <c:pt idx="178">
-                  <c:v>105.76599999999985</c:v>
-                </c:pt>
-                <c:pt idx="179">
-                  <c:v>105.89100000000187</c:v>
-                </c:pt>
-                <c:pt idx="180">
-                  <c:v>105.99999999999419</c:v>
-                </c:pt>
-                <c:pt idx="181">
-                  <c:v>106.1089999999961</c:v>
-                </c:pt>
-                <c:pt idx="182">
-                  <c:v>106.21900000000402</c:v>
-                </c:pt>
-                <c:pt idx="183">
-                  <c:v>106.32799999999634</c:v>
-                </c:pt>
-                <c:pt idx="184">
-                  <c:v>106.45299999999835</c:v>
-                </c:pt>
-                <c:pt idx="185">
-                  <c:v>106.56200000000027</c:v>
-                </c:pt>
-                <c:pt idx="186">
-                  <c:v>106.67199999999859</c:v>
-                </c:pt>
-                <c:pt idx="187">
-                  <c:v>106.7810000000005</c:v>
-                </c:pt>
-                <c:pt idx="188">
-                  <c:v>106.89099999999883</c:v>
-                </c:pt>
-                <c:pt idx="189">
-                  <c:v>107.00000000000074</c:v>
-                </c:pt>
-                <c:pt idx="190">
-                  <c:v>107.12499999999316</c:v>
-                </c:pt>
-                <c:pt idx="191">
-                  <c:v>107.23399999999508</c:v>
-                </c:pt>
-                <c:pt idx="192">
-                  <c:v>107.3589999999971</c:v>
-                </c:pt>
-                <c:pt idx="193">
-                  <c:v>107.46900000000501</c:v>
-                </c:pt>
-                <c:pt idx="194">
-                  <c:v>107.59399999999744</c:v>
-                </c:pt>
-                <c:pt idx="195">
-                  <c:v>107.70299999999935</c:v>
-                </c:pt>
-                <c:pt idx="196">
-                  <c:v>107.81200000000126</c:v>
-                </c:pt>
-                <c:pt idx="197">
-                  <c:v>107.92199999999958</c:v>
-                </c:pt>
-                <c:pt idx="198">
-                  <c:v>108.0310000000015</c:v>
-                </c:pt>
-                <c:pt idx="199">
-                  <c:v>108.14099999999982</c:v>
-                </c:pt>
-                <c:pt idx="200">
-                  <c:v>108.25000000000173</c:v>
-                </c:pt>
-                <c:pt idx="201">
-                  <c:v>108.37499999999416</c:v>
-                </c:pt>
-                <c:pt idx="202">
-                  <c:v>108.49999999999618</c:v>
-                </c:pt>
-                <c:pt idx="203">
-                  <c:v>108.60899999999809</c:v>
-                </c:pt>
-                <c:pt idx="204">
-                  <c:v>108.71899999999641</c:v>
-                </c:pt>
-                <c:pt idx="205">
-                  <c:v>108.82799999999833</c:v>
-                </c:pt>
-                <c:pt idx="206">
-                  <c:v>108.95300000000034</c:v>
-                </c:pt>
-                <c:pt idx="207">
-                  <c:v>109.06200000000226</c:v>
-                </c:pt>
-                <c:pt idx="208">
-                  <c:v>109.17200000000058</c:v>
-                </c:pt>
-                <c:pt idx="209">
-                  <c:v>109.28100000000249</c:v>
-                </c:pt>
-                <c:pt idx="210">
-                  <c:v>109.39100000000082</c:v>
-                </c:pt>
-                <c:pt idx="211">
-                  <c:v>109.51599999999324</c:v>
-                </c:pt>
-                <c:pt idx="212">
-                  <c:v>109.62499999999515</c:v>
-                </c:pt>
-                <c:pt idx="213">
-                  <c:v>109.73399999999707</c:v>
-                </c:pt>
-                <c:pt idx="214">
-                  <c:v>109.84400000000498</c:v>
-                </c:pt>
-                <c:pt idx="215">
-                  <c:v>109.9529999999973</c:v>
-                </c:pt>
-                <c:pt idx="216">
-                  <c:v>110.06199999999922</c:v>
-                </c:pt>
-                <c:pt idx="217">
-                  <c:v>110.18700000000123</c:v>
-                </c:pt>
-              </c:numCache>
-            </c:numRef>
-          </c:xVal>
-          <c:yVal>
-            <c:numRef>
-              <c:f>'WELD DATA (2)'!$BV$2:$BV$2211</c:f>
-              <c:numCache>
-                <c:formatCode>0.0000</c:formatCode>
-                <c:ptCount val="218"/>
-                <c:pt idx="0">
-                  <c:v>4.9870000000000001</c:v>
-                </c:pt>
-                <c:pt idx="1">
-                  <c:v>4.9870000000000001</c:v>
-                </c:pt>
-                <c:pt idx="2">
-                  <c:v>4.9870000000000001</c:v>
-                </c:pt>
-                <c:pt idx="3">
-                  <c:v>4.9870000000000001</c:v>
-                </c:pt>
-                <c:pt idx="4">
-                  <c:v>4.9870000000000001</c:v>
-                </c:pt>
-                <c:pt idx="5">
-                  <c:v>4.9870000000000001</c:v>
-                </c:pt>
-                <c:pt idx="6">
-                  <c:v>4.9870000000000001</c:v>
-                </c:pt>
-                <c:pt idx="7">
-                  <c:v>4.9870000000000001</c:v>
-                </c:pt>
-                <c:pt idx="8">
-                  <c:v>4.9870000000000001</c:v>
-                </c:pt>
-                <c:pt idx="9">
-                  <c:v>4.9870000000000001</c:v>
-                </c:pt>
-                <c:pt idx="10">
-                  <c:v>4.9870000000000001</c:v>
-                </c:pt>
-                <c:pt idx="11">
-                  <c:v>4.9870000000000001</c:v>
-                </c:pt>
-                <c:pt idx="12">
-                  <c:v>4.2911000000000001</c:v>
-                </c:pt>
-                <c:pt idx="13">
-                  <c:v>4.2911000000000001</c:v>
-                </c:pt>
-                <c:pt idx="14">
-                  <c:v>4.2911000000000001</c:v>
-                </c:pt>
-                <c:pt idx="15">
-                  <c:v>4.2911000000000001</c:v>
-                </c:pt>
-                <c:pt idx="16">
-                  <c:v>4.2911000000000001</c:v>
-                </c:pt>
-                <c:pt idx="17">
-                  <c:v>4.2911000000000001</c:v>
-                </c:pt>
-                <c:pt idx="18">
-                  <c:v>4.2911000000000001</c:v>
-                </c:pt>
-                <c:pt idx="19">
-                  <c:v>4.2911000000000001</c:v>
-                </c:pt>
-                <c:pt idx="20">
-                  <c:v>4.2911000000000001</c:v>
-                </c:pt>
-                <c:pt idx="21">
-                  <c:v>4.2911000000000001</c:v>
-                </c:pt>
-                <c:pt idx="22">
-                  <c:v>4.2911000000000001</c:v>
-                </c:pt>
-                <c:pt idx="23">
-                  <c:v>4.2911000000000001</c:v>
-                </c:pt>
-                <c:pt idx="24">
-                  <c:v>4.2911000000000001</c:v>
-                </c:pt>
-                <c:pt idx="25">
-                  <c:v>4.2911000000000001</c:v>
-                </c:pt>
-                <c:pt idx="26">
-                  <c:v>4.2911000000000001</c:v>
-                </c:pt>
-                <c:pt idx="27">
-                  <c:v>4.2911000000000001</c:v>
-                </c:pt>
-                <c:pt idx="28">
-                  <c:v>4.2911000000000001</c:v>
-                </c:pt>
-                <c:pt idx="29">
-                  <c:v>4.2911000000000001</c:v>
-                </c:pt>
-                <c:pt idx="30">
-                  <c:v>4.2911000000000001</c:v>
-                </c:pt>
-                <c:pt idx="31">
-                  <c:v>4.2911000000000001</c:v>
-                </c:pt>
-                <c:pt idx="32">
-                  <c:v>4.2911000000000001</c:v>
-                </c:pt>
-                <c:pt idx="33">
-                  <c:v>4.2911000000000001</c:v>
-                </c:pt>
-                <c:pt idx="34">
-                  <c:v>4.2911000000000001</c:v>
-                </c:pt>
-                <c:pt idx="35">
-                  <c:v>4.2911000000000001</c:v>
-                </c:pt>
-                <c:pt idx="36">
-                  <c:v>4.2911000000000001</c:v>
-                </c:pt>
-                <c:pt idx="37">
-                  <c:v>4.2911000000000001</c:v>
-                </c:pt>
-                <c:pt idx="38">
-                  <c:v>4.9870000000000001</c:v>
-                </c:pt>
-                <c:pt idx="39">
-                  <c:v>4.9870000000000001</c:v>
-                </c:pt>
-                <c:pt idx="40">
-                  <c:v>4.9870000000000001</c:v>
-                </c:pt>
-                <c:pt idx="41">
-                  <c:v>4.9870000000000001</c:v>
-                </c:pt>
-                <c:pt idx="42">
-                  <c:v>4.9870000000000001</c:v>
-                </c:pt>
-                <c:pt idx="43">
-                  <c:v>4.9870000000000001</c:v>
-                </c:pt>
-                <c:pt idx="44">
-                  <c:v>4.9870000000000001</c:v>
-                </c:pt>
-                <c:pt idx="45">
-                  <c:v>4.9870000000000001</c:v>
-                </c:pt>
-                <c:pt idx="46">
-                  <c:v>4.9870000000000001</c:v>
-                </c:pt>
-                <c:pt idx="47">
-                  <c:v>4.9870000000000001</c:v>
-                </c:pt>
-                <c:pt idx="48">
-                  <c:v>4.9870000000000001</c:v>
-                </c:pt>
-                <c:pt idx="49">
-                  <c:v>4.9870000000000001</c:v>
-                </c:pt>
-                <c:pt idx="50">
-                  <c:v>4.9870000000000001</c:v>
-                </c:pt>
-                <c:pt idx="51">
-                  <c:v>4.9870000000000001</c:v>
-                </c:pt>
-                <c:pt idx="52">
-                  <c:v>4.9870000000000001</c:v>
-                </c:pt>
-                <c:pt idx="53">
-                  <c:v>4.9870000000000001</c:v>
-                </c:pt>
-                <c:pt idx="54">
-                  <c:v>4.9870000000000001</c:v>
-                </c:pt>
-                <c:pt idx="55">
-                  <c:v>4.9870000000000001</c:v>
-                </c:pt>
-                <c:pt idx="56">
-                  <c:v>4.9870000000000001</c:v>
-                </c:pt>
-                <c:pt idx="57">
-                  <c:v>4.9870000000000001</c:v>
-                </c:pt>
-                <c:pt idx="58">
-                  <c:v>4.9870000000000001</c:v>
-                </c:pt>
-                <c:pt idx="59">
-                  <c:v>4.9870000000000001</c:v>
-                </c:pt>
-                <c:pt idx="60">
-                  <c:v>4.9870000000000001</c:v>
-                </c:pt>
-                <c:pt idx="61">
-                  <c:v>4.9870000000000001</c:v>
-                </c:pt>
-                <c:pt idx="62">
-                  <c:v>4.9870000000000001</c:v>
-                </c:pt>
-                <c:pt idx="63">
-                  <c:v>4.9870000000000001</c:v>
-                </c:pt>
-                <c:pt idx="64">
-                  <c:v>4.9870000000000001</c:v>
-                </c:pt>
-                <c:pt idx="65">
-                  <c:v>4.9870000000000001</c:v>
-                </c:pt>
-                <c:pt idx="66">
-                  <c:v>4.9870000000000001</c:v>
-                </c:pt>
-                <c:pt idx="67">
-                  <c:v>4.9870000000000001</c:v>
-                </c:pt>
-                <c:pt idx="68">
-                  <c:v>4.9870000000000001</c:v>
-                </c:pt>
-                <c:pt idx="69">
-                  <c:v>4.9870000000000001</c:v>
-                </c:pt>
-                <c:pt idx="70">
-                  <c:v>4.9870000000000001</c:v>
-                </c:pt>
-                <c:pt idx="71">
-                  <c:v>4.2911000000000001</c:v>
-                </c:pt>
-                <c:pt idx="72">
-                  <c:v>4.2911000000000001</c:v>
-                </c:pt>
-                <c:pt idx="73">
-                  <c:v>4.2911000000000001</c:v>
-                </c:pt>
-                <c:pt idx="74">
-                  <c:v>4.2911000000000001</c:v>
-                </c:pt>
-                <c:pt idx="75">
-                  <c:v>4.2911000000000001</c:v>
-                </c:pt>
-                <c:pt idx="76">
-                  <c:v>4.2911000000000001</c:v>
-                </c:pt>
-                <c:pt idx="77">
-                  <c:v>4.2911000000000001</c:v>
-                </c:pt>
-                <c:pt idx="78">
-                  <c:v>4.2911000000000001</c:v>
-                </c:pt>
-                <c:pt idx="79">
-                  <c:v>4.2911000000000001</c:v>
-                </c:pt>
-                <c:pt idx="80">
-                  <c:v>4.2911000000000001</c:v>
-                </c:pt>
-                <c:pt idx="81">
-                  <c:v>4.2911000000000001</c:v>
-                </c:pt>
-                <c:pt idx="82">
-                  <c:v>4.2911000000000001</c:v>
-                </c:pt>
-                <c:pt idx="83">
-                  <c:v>4.2911000000000001</c:v>
-                </c:pt>
-                <c:pt idx="84">
-                  <c:v>4.2911000000000001</c:v>
-                </c:pt>
-                <c:pt idx="85">
-                  <c:v>4.2911000000000001</c:v>
-                </c:pt>
-                <c:pt idx="86">
-                  <c:v>4.2911000000000001</c:v>
-                </c:pt>
-                <c:pt idx="87">
-                  <c:v>4.2911000000000001</c:v>
-                </c:pt>
-                <c:pt idx="88">
-                  <c:v>4.2911000000000001</c:v>
-                </c:pt>
-                <c:pt idx="89">
-                  <c:v>4.2911000000000001</c:v>
-                </c:pt>
-                <c:pt idx="90">
-                  <c:v>4.2911000000000001</c:v>
-                </c:pt>
-                <c:pt idx="91">
-                  <c:v>4.2911000000000001</c:v>
-                </c:pt>
-                <c:pt idx="92">
-                  <c:v>4.2911000000000001</c:v>
-                </c:pt>
-                <c:pt idx="93">
-                  <c:v>4.2911000000000001</c:v>
-                </c:pt>
-                <c:pt idx="94">
-                  <c:v>4.2911000000000001</c:v>
-                </c:pt>
-                <c:pt idx="95">
-                  <c:v>4.2911000000000001</c:v>
-                </c:pt>
-                <c:pt idx="96">
-                  <c:v>4.2911000000000001</c:v>
-                </c:pt>
-                <c:pt idx="97">
-                  <c:v>4.2911000000000001</c:v>
-                </c:pt>
-                <c:pt idx="98">
-                  <c:v>4.2911000000000001</c:v>
-                </c:pt>
-                <c:pt idx="99">
-                  <c:v>4.2911000000000001</c:v>
-                </c:pt>
-                <c:pt idx="100">
-                  <c:v>4.2911000000000001</c:v>
-                </c:pt>
-                <c:pt idx="101">
-                  <c:v>4.2911000000000001</c:v>
-                </c:pt>
-                <c:pt idx="102">
-                  <c:v>4.2911000000000001</c:v>
-                </c:pt>
-                <c:pt idx="103">
-                  <c:v>4.2911000000000001</c:v>
-                </c:pt>
-                <c:pt idx="104">
-                  <c:v>4.2911000000000001</c:v>
-                </c:pt>
-                <c:pt idx="105">
-                  <c:v>4.9870000000000001</c:v>
-                </c:pt>
-                <c:pt idx="106">
-                  <c:v>4.9870000000000001</c:v>
-                </c:pt>
-                <c:pt idx="107">
-                  <c:v>4.9870000000000001</c:v>
-                </c:pt>
-                <c:pt idx="108">
-                  <c:v>4.9870000000000001</c:v>
-                </c:pt>
-                <c:pt idx="109">
-                  <c:v>4.9870000000000001</c:v>
-                </c:pt>
-                <c:pt idx="110">
-                  <c:v>4.9870000000000001</c:v>
-                </c:pt>
-                <c:pt idx="111">
-                  <c:v>4.9870000000000001</c:v>
-                </c:pt>
-                <c:pt idx="112">
-                  <c:v>4.9870000000000001</c:v>
-                </c:pt>
-                <c:pt idx="113">
-                  <c:v>4.9870000000000001</c:v>
-                </c:pt>
-                <c:pt idx="114">
-                  <c:v>4.9870000000000001</c:v>
-                </c:pt>
-                <c:pt idx="115">
-                  <c:v>4.9870000000000001</c:v>
-                </c:pt>
-                <c:pt idx="116">
-                  <c:v>4.9870000000000001</c:v>
-                </c:pt>
-                <c:pt idx="117">
-                  <c:v>4.9870000000000001</c:v>
-                </c:pt>
-                <c:pt idx="118">
-                  <c:v>4.9870000000000001</c:v>
-                </c:pt>
-                <c:pt idx="119">
-                  <c:v>4.9870000000000001</c:v>
-                </c:pt>
-                <c:pt idx="120">
-                  <c:v>4.9870000000000001</c:v>
-                </c:pt>
-                <c:pt idx="121">
-                  <c:v>4.9870000000000001</c:v>
-                </c:pt>
-                <c:pt idx="122">
-                  <c:v>4.9870000000000001</c:v>
-                </c:pt>
-                <c:pt idx="123">
-                  <c:v>4.9870000000000001</c:v>
-                </c:pt>
-                <c:pt idx="124">
-                  <c:v>4.9870000000000001</c:v>
-                </c:pt>
-                <c:pt idx="125">
-                  <c:v>4.9870000000000001</c:v>
-                </c:pt>
-                <c:pt idx="126">
-                  <c:v>4.9870000000000001</c:v>
-                </c:pt>
-                <c:pt idx="127">
-                  <c:v>4.9870000000000001</c:v>
-                </c:pt>
-                <c:pt idx="128">
-                  <c:v>4.9870000000000001</c:v>
-                </c:pt>
-                <c:pt idx="129">
-                  <c:v>4.9870000000000001</c:v>
-                </c:pt>
-                <c:pt idx="130">
-                  <c:v>4.9870000000000001</c:v>
-                </c:pt>
-                <c:pt idx="131">
-                  <c:v>4.9870000000000001</c:v>
-                </c:pt>
-                <c:pt idx="132">
-                  <c:v>4.9870000000000001</c:v>
-                </c:pt>
-                <c:pt idx="133">
-                  <c:v>4.9870000000000001</c:v>
-                </c:pt>
-                <c:pt idx="134">
-                  <c:v>4.9870000000000001</c:v>
-                </c:pt>
-                <c:pt idx="135">
-                  <c:v>4.9870000000000001</c:v>
-                </c:pt>
-                <c:pt idx="136">
-                  <c:v>4.9870000000000001</c:v>
-                </c:pt>
-                <c:pt idx="137">
-                  <c:v>4.9870000000000001</c:v>
-                </c:pt>
-                <c:pt idx="138">
-                  <c:v>4.9870000000000001</c:v>
-                </c:pt>
-                <c:pt idx="139">
-                  <c:v>4.9870000000000001</c:v>
-                </c:pt>
-                <c:pt idx="140">
-                  <c:v>4.9870000000000001</c:v>
-                </c:pt>
-                <c:pt idx="141">
-                  <c:v>4.9870000000000001</c:v>
-                </c:pt>
-                <c:pt idx="142">
-                  <c:v>4.9870000000000001</c:v>
-                </c:pt>
-                <c:pt idx="143">
-                  <c:v>4.9870000000000001</c:v>
-                </c:pt>
-                <c:pt idx="144">
-                  <c:v>4.2911000000000001</c:v>
-                </c:pt>
-                <c:pt idx="145">
-                  <c:v>4.2911000000000001</c:v>
-                </c:pt>
-                <c:pt idx="146">
-                  <c:v>4.2911000000000001</c:v>
-                </c:pt>
-                <c:pt idx="147">
-                  <c:v>4.2911000000000001</c:v>
-                </c:pt>
-                <c:pt idx="148">
-                  <c:v>4.2911000000000001</c:v>
-                </c:pt>
-                <c:pt idx="149">
-                  <c:v>4.2911000000000001</c:v>
-                </c:pt>
-                <c:pt idx="150">
-                  <c:v>4.2911000000000001</c:v>
-                </c:pt>
-                <c:pt idx="151">
-                  <c:v>4.2911000000000001</c:v>
-                </c:pt>
-                <c:pt idx="152">
-                  <c:v>4.2911000000000001</c:v>
-                </c:pt>
-                <c:pt idx="153">
-                  <c:v>4.2911000000000001</c:v>
-                </c:pt>
-                <c:pt idx="154">
-                  <c:v>4.2911000000000001</c:v>
-                </c:pt>
-                <c:pt idx="155">
-                  <c:v>4.2911000000000001</c:v>
-                </c:pt>
-                <c:pt idx="156">
-                  <c:v>4.2911000000000001</c:v>
-                </c:pt>
-                <c:pt idx="157">
-                  <c:v>4.2911000000000001</c:v>
-                </c:pt>
-                <c:pt idx="158">
-                  <c:v>4.2911000000000001</c:v>
-                </c:pt>
-                <c:pt idx="159">
-                  <c:v>4.2911000000000001</c:v>
-                </c:pt>
-                <c:pt idx="160">
-                  <c:v>4.2911000000000001</c:v>
-                </c:pt>
-                <c:pt idx="161">
-                  <c:v>4.2911000000000001</c:v>
-                </c:pt>
-                <c:pt idx="162">
-                  <c:v>4.2911000000000001</c:v>
-                </c:pt>
-                <c:pt idx="163">
-                  <c:v>4.2911000000000001</c:v>
-                </c:pt>
-                <c:pt idx="164">
-                  <c:v>4.2911000000000001</c:v>
-                </c:pt>
-                <c:pt idx="165">
-                  <c:v>4.2911000000000001</c:v>
-                </c:pt>
-                <c:pt idx="166">
-                  <c:v>4.2911000000000001</c:v>
-                </c:pt>
-                <c:pt idx="167">
-                  <c:v>4.2911000000000001</c:v>
-                </c:pt>
-                <c:pt idx="168">
-                  <c:v>4.2911000000000001</c:v>
-                </c:pt>
-                <c:pt idx="169">
-                  <c:v>4.2911000000000001</c:v>
-                </c:pt>
-                <c:pt idx="170">
-                  <c:v>4.2911000000000001</c:v>
-                </c:pt>
-                <c:pt idx="171">
-                  <c:v>4.2911000000000001</c:v>
-                </c:pt>
-                <c:pt idx="172">
-                  <c:v>4.2911000000000001</c:v>
-                </c:pt>
-                <c:pt idx="173">
-                  <c:v>4.2911000000000001</c:v>
-                </c:pt>
-                <c:pt idx="174">
-                  <c:v>4.2911000000000001</c:v>
-                </c:pt>
-                <c:pt idx="175">
-                  <c:v>4.2911000000000001</c:v>
-                </c:pt>
-                <c:pt idx="176">
-                  <c:v>4.2911000000000001</c:v>
-                </c:pt>
-                <c:pt idx="177">
-                  <c:v>4.2911000000000001</c:v>
-                </c:pt>
-                <c:pt idx="178">
-                  <c:v>4.2911000000000001</c:v>
-                </c:pt>
-                <c:pt idx="179">
-                  <c:v>4.2911000000000001</c:v>
-                </c:pt>
-                <c:pt idx="180">
-                  <c:v>4.2911000000000001</c:v>
-                </c:pt>
-                <c:pt idx="181">
-                  <c:v>4.2911000000000001</c:v>
-                </c:pt>
-                <c:pt idx="182">
-                  <c:v>4.2911000000000001</c:v>
-                </c:pt>
-                <c:pt idx="183">
-                  <c:v>4.2911000000000001</c:v>
-                </c:pt>
-                <c:pt idx="184">
-                  <c:v>4.2911000000000001</c:v>
-                </c:pt>
-                <c:pt idx="185">
-                  <c:v>4.2911000000000001</c:v>
-                </c:pt>
-                <c:pt idx="186">
-                  <c:v>4.2911000000000001</c:v>
-                </c:pt>
-                <c:pt idx="187">
-                  <c:v>4.2911000000000001</c:v>
-                </c:pt>
-                <c:pt idx="188">
-                  <c:v>4.2911000000000001</c:v>
-                </c:pt>
-                <c:pt idx="189">
-                  <c:v>4.2911000000000001</c:v>
-                </c:pt>
-                <c:pt idx="190">
-                  <c:v>4.2911000000000001</c:v>
-                </c:pt>
-                <c:pt idx="191">
-                  <c:v>4.2911000000000001</c:v>
-                </c:pt>
-                <c:pt idx="192">
-                  <c:v>4.2911000000000001</c:v>
-                </c:pt>
-                <c:pt idx="193">
-                  <c:v>4.2911000000000001</c:v>
-                </c:pt>
-                <c:pt idx="194">
-                  <c:v>4.2911000000000001</c:v>
-                </c:pt>
-                <c:pt idx="195">
-                  <c:v>4.2911000000000001</c:v>
-                </c:pt>
-                <c:pt idx="196">
-                  <c:v>4.2911000000000001</c:v>
-                </c:pt>
-                <c:pt idx="197">
-                  <c:v>4.2911000000000001</c:v>
-                </c:pt>
-                <c:pt idx="198">
-                  <c:v>4.2911000000000001</c:v>
-                </c:pt>
-                <c:pt idx="199">
-                  <c:v>4.2911000000000001</c:v>
-                </c:pt>
-                <c:pt idx="200">
-                  <c:v>4.2911000000000001</c:v>
-                </c:pt>
-                <c:pt idx="201">
-                  <c:v>4.2911000000000001</c:v>
-                </c:pt>
-                <c:pt idx="202">
-                  <c:v>4.2911000000000001</c:v>
-                </c:pt>
-                <c:pt idx="203">
-                  <c:v>4.2911000000000001</c:v>
-                </c:pt>
-                <c:pt idx="204">
-                  <c:v>4.2911000000000001</c:v>
-                </c:pt>
-                <c:pt idx="205">
-                  <c:v>4.2911000000000001</c:v>
-                </c:pt>
-                <c:pt idx="206">
-                  <c:v>4.2911000000000001</c:v>
-                </c:pt>
-                <c:pt idx="207">
-                  <c:v>4.2911000000000001</c:v>
-                </c:pt>
-                <c:pt idx="208">
-                  <c:v>4.2911000000000001</c:v>
-                </c:pt>
-                <c:pt idx="209">
-                  <c:v>4.2911000000000001</c:v>
-                </c:pt>
-                <c:pt idx="210">
-                  <c:v>4.2911000000000001</c:v>
-                </c:pt>
-                <c:pt idx="211">
-                  <c:v>4.2911000000000001</c:v>
-                </c:pt>
-                <c:pt idx="212">
-                  <c:v>4.2911000000000001</c:v>
-                </c:pt>
-                <c:pt idx="213">
-                  <c:v>4.2911000000000001</c:v>
-                </c:pt>
-                <c:pt idx="214">
-                  <c:v>4.2911000000000001</c:v>
-                </c:pt>
-                <c:pt idx="215">
-                  <c:v>4.2911000000000001</c:v>
-                </c:pt>
-                <c:pt idx="216">
-                  <c:v>4.2911000000000001</c:v>
-                </c:pt>
-                <c:pt idx="217">
-                  <c:v>4.2911000000000001</c:v>
-                </c:pt>
-              </c:numCache>
-            </c:numRef>
-          </c:yVal>
-          <c:smooth val="1"/>
-          <c:extLst>
-            <c:ext xmlns:c16="http://schemas.microsoft.com/office/drawing/2014/chart" uri="{C3380CC4-5D6E-409C-BE32-E72D297353CC}">
-              <c16:uniqueId val="{00000003-1916-4280-8861-1324C38776F2}"/>
-            </c:ext>
-          </c:extLst>
-        </c:ser>
-        <c:dLbls>
-          <c:showLegendKey val="0"/>
-          <c:showVal val="0"/>
-          <c:showCatName val="0"/>
-          <c:showSerName val="0"/>
-          <c:showPercent val="0"/>
-          <c:showBubbleSize val="0"/>
-        </c:dLbls>
-        <c:axId val="45734144"/>
-        <c:axId val="45724032"/>
-      </c:scatterChart>
-      <c:valAx>
-        <c:axId val="55147904"/>
-        <c:scaling>
-          <c:orientation val="minMax"/>
-          <c:max val="120"/>
-          <c:min val="80"/>
-        </c:scaling>
-        <c:delete val="0"/>
-        <c:axPos val="b"/>
-        <c:title>
-          <c:tx>
-            <c:rich>
-              <a:bodyPr/>
-              <a:lstStyle/>
-              <a:p>
-                <a:pPr>
-                  <a:defRPr/>
-                </a:pPr>
-                <a:r>
-                  <a:rPr lang="en-US" sz="1800" dirty="0"/>
-                  <a:t>Time [sec]</a:t>
-                </a:r>
-              </a:p>
-            </c:rich>
-          </c:tx>
-          <c:overlay val="0"/>
-        </c:title>
-        <c:numFmt formatCode="0.00" sourceLinked="1"/>
-        <c:majorTickMark val="out"/>
-        <c:minorTickMark val="none"/>
-        <c:tickLblPos val="nextTo"/>
-        <c:crossAx val="58872960"/>
-        <c:crosses val="autoZero"/>
-        <c:crossBetween val="midCat"/>
-      </c:valAx>
-      <c:valAx>
-        <c:axId val="58872960"/>
-        <c:scaling>
-          <c:orientation val="minMax"/>
-        </c:scaling>
-        <c:delete val="0"/>
-        <c:axPos val="l"/>
-        <c:majorGridlines/>
-        <c:title>
-          <c:tx>
-            <c:rich>
-              <a:bodyPr/>
-              <a:lstStyle/>
-              <a:p>
-                <a:pPr>
-                  <a:defRPr/>
-                </a:pPr>
-                <a:r>
-                  <a:rPr lang="en-US" sz="2800" dirty="0">
-                    <a:solidFill>
-                      <a:schemeClr val="accent1">
-                        <a:lumMod val="75000"/>
-                      </a:schemeClr>
-                    </a:solidFill>
-                  </a:rPr>
-                  <a:t>Temperature [degree</a:t>
-                </a:r>
-                <a:r>
-                  <a:rPr lang="en-US" sz="2800" baseline="0" dirty="0">
-                    <a:solidFill>
-                      <a:schemeClr val="accent1">
-                        <a:lumMod val="75000"/>
-                      </a:schemeClr>
-                    </a:solidFill>
-                  </a:rPr>
-                  <a:t> C]</a:t>
-                </a:r>
-                <a:endParaRPr lang="en-US" sz="2800" dirty="0">
-                  <a:solidFill>
-                    <a:schemeClr val="accent1">
-                      <a:lumMod val="75000"/>
-                    </a:schemeClr>
-                  </a:solidFill>
-                </a:endParaRPr>
-              </a:p>
-            </c:rich>
-          </c:tx>
-          <c:overlay val="0"/>
-        </c:title>
-        <c:numFmt formatCode="0" sourceLinked="0"/>
-        <c:majorTickMark val="out"/>
-        <c:minorTickMark val="none"/>
-        <c:tickLblPos val="nextTo"/>
-        <c:txPr>
-          <a:bodyPr/>
-          <a:lstStyle/>
-          <a:p>
-            <a:pPr>
-              <a:defRPr sz="1600"/>
-            </a:pPr>
-            <a:endParaRPr lang="en-US"/>
-          </a:p>
-        </c:txPr>
-        <c:crossAx val="55147904"/>
-        <c:crosses val="autoZero"/>
-        <c:crossBetween val="midCat"/>
-      </c:valAx>
-      <c:valAx>
-        <c:axId val="45724032"/>
-        <c:scaling>
-          <c:orientation val="minMax"/>
-        </c:scaling>
-        <c:delete val="0"/>
-        <c:axPos val="r"/>
-        <c:title>
-          <c:tx>
-            <c:rich>
-              <a:bodyPr/>
-              <a:lstStyle/>
-              <a:p>
-                <a:pPr>
-                  <a:defRPr/>
-                </a:pPr>
-                <a:r>
-                  <a:rPr lang="en-US" sz="3200" dirty="0">
-                    <a:solidFill>
-                      <a:schemeClr val="accent2"/>
-                    </a:solidFill>
-                  </a:rPr>
-                  <a:t>Power</a:t>
-                </a:r>
-                <a:r>
-                  <a:rPr lang="en-US" sz="3200" baseline="0" dirty="0">
-                    <a:solidFill>
-                      <a:schemeClr val="accent2"/>
-                    </a:solidFill>
-                  </a:rPr>
-                  <a:t> [kW]</a:t>
-                </a:r>
-                <a:endParaRPr lang="en-US" sz="3200" dirty="0">
-                  <a:solidFill>
-                    <a:schemeClr val="accent2"/>
-                  </a:solidFill>
-                </a:endParaRPr>
-              </a:p>
-            </c:rich>
-          </c:tx>
-          <c:overlay val="0"/>
-        </c:title>
-        <c:numFmt formatCode="0.0" sourceLinked="0"/>
-        <c:majorTickMark val="out"/>
-        <c:minorTickMark val="none"/>
-        <c:tickLblPos val="nextTo"/>
-        <c:txPr>
-          <a:bodyPr/>
-          <a:lstStyle/>
-          <a:p>
-            <a:pPr>
-              <a:defRPr sz="1600"/>
-            </a:pPr>
-            <a:endParaRPr lang="en-US"/>
-          </a:p>
-        </c:txPr>
-        <c:crossAx val="45734144"/>
-        <c:crosses val="max"/>
-        <c:crossBetween val="midCat"/>
-      </c:valAx>
-      <c:valAx>
-        <c:axId val="45734144"/>
-        <c:scaling>
-          <c:orientation val="minMax"/>
-        </c:scaling>
-        <c:delete val="1"/>
-        <c:axPos val="b"/>
-        <c:numFmt formatCode="0.00" sourceLinked="1"/>
-        <c:majorTickMark val="out"/>
-        <c:minorTickMark val="none"/>
-        <c:tickLblPos val="nextTo"/>
-        <c:crossAx val="45724032"/>
-        <c:crosses val="autoZero"/>
-        <c:crossBetween val="midCat"/>
-      </c:valAx>
-    </c:plotArea>
-    <c:legend>
-      <c:legendPos val="r"/>
-      <c:overlay val="0"/>
-    </c:legend>
-    <c:plotVisOnly val="1"/>
-    <c:dispBlanksAs val="gap"/>
-    <c:showDLblsOverMax val="0"/>
-  </c:chart>
-  <c:externalData r:id="rId1">
-    <c:autoUpdate val="0"/>
-  </c:externalData>
-</c:chartSpace>
 </file>
 
 <file path=ppt/slideLayouts/slideLayout1.xml><?xml version="1.0" encoding="utf-8"?>
@@ -3299,7 +509,7 @@
           <a:p>
             <a:fld id="{E2F8E41F-600C-44C8-A86B-0BC25D46D26A}" type="datetimeFigureOut">
               <a:rPr lang="en-US" smtClean="0"/>
-              <a:t>9/1/2020</a:t>
+              <a:t>9/3/2020</a:t>
             </a:fld>
             <a:endParaRPr lang="en-US"/>
           </a:p>
@@ -3497,7 +707,7 @@
           <a:p>
             <a:fld id="{E2F8E41F-600C-44C8-A86B-0BC25D46D26A}" type="datetimeFigureOut">
               <a:rPr lang="en-US" smtClean="0"/>
-              <a:t>9/1/2020</a:t>
+              <a:t>9/3/2020</a:t>
             </a:fld>
             <a:endParaRPr lang="en-US"/>
           </a:p>
@@ -3705,7 +915,7 @@
           <a:p>
             <a:fld id="{E2F8E41F-600C-44C8-A86B-0BC25D46D26A}" type="datetimeFigureOut">
               <a:rPr lang="en-US" smtClean="0"/>
-              <a:t>9/1/2020</a:t>
+              <a:t>9/3/2020</a:t>
             </a:fld>
             <a:endParaRPr lang="en-US"/>
           </a:p>
@@ -3903,7 +1113,7 @@
           <a:p>
             <a:fld id="{E2F8E41F-600C-44C8-A86B-0BC25D46D26A}" type="datetimeFigureOut">
               <a:rPr lang="en-US" smtClean="0"/>
-              <a:t>9/1/2020</a:t>
+              <a:t>9/3/2020</a:t>
             </a:fld>
             <a:endParaRPr lang="en-US"/>
           </a:p>
@@ -4178,7 +1388,7 @@
           <a:p>
             <a:fld id="{E2F8E41F-600C-44C8-A86B-0BC25D46D26A}" type="datetimeFigureOut">
               <a:rPr lang="en-US" smtClean="0"/>
-              <a:t>9/1/2020</a:t>
+              <a:t>9/3/2020</a:t>
             </a:fld>
             <a:endParaRPr lang="en-US"/>
           </a:p>
@@ -4443,7 +1653,7 @@
           <a:p>
             <a:fld id="{E2F8E41F-600C-44C8-A86B-0BC25D46D26A}" type="datetimeFigureOut">
               <a:rPr lang="en-US" smtClean="0"/>
-              <a:t>9/1/2020</a:t>
+              <a:t>9/3/2020</a:t>
             </a:fld>
             <a:endParaRPr lang="en-US"/>
           </a:p>
@@ -4855,7 +2065,7 @@
           <a:p>
             <a:fld id="{E2F8E41F-600C-44C8-A86B-0BC25D46D26A}" type="datetimeFigureOut">
               <a:rPr lang="en-US" smtClean="0"/>
-              <a:t>9/1/2020</a:t>
+              <a:t>9/3/2020</a:t>
             </a:fld>
             <a:endParaRPr lang="en-US"/>
           </a:p>
@@ -4996,7 +2206,7 @@
           <a:p>
             <a:fld id="{E2F8E41F-600C-44C8-A86B-0BC25D46D26A}" type="datetimeFigureOut">
               <a:rPr lang="en-US" smtClean="0"/>
-              <a:t>9/1/2020</a:t>
+              <a:t>9/3/2020</a:t>
             </a:fld>
             <a:endParaRPr lang="en-US"/>
           </a:p>
@@ -5109,7 +2319,7 @@
           <a:p>
             <a:fld id="{E2F8E41F-600C-44C8-A86B-0BC25D46D26A}" type="datetimeFigureOut">
               <a:rPr lang="en-US" smtClean="0"/>
-              <a:t>9/1/2020</a:t>
+              <a:t>9/3/2020</a:t>
             </a:fld>
             <a:endParaRPr lang="en-US"/>
           </a:p>
@@ -5420,7 +2630,7 @@
           <a:p>
             <a:fld id="{E2F8E41F-600C-44C8-A86B-0BC25D46D26A}" type="datetimeFigureOut">
               <a:rPr lang="en-US" smtClean="0"/>
-              <a:t>9/1/2020</a:t>
+              <a:t>9/3/2020</a:t>
             </a:fld>
             <a:endParaRPr lang="en-US"/>
           </a:p>
@@ -5708,7 +2918,7 @@
           <a:p>
             <a:fld id="{E2F8E41F-600C-44C8-A86B-0BC25D46D26A}" type="datetimeFigureOut">
               <a:rPr lang="en-US" smtClean="0"/>
-              <a:t>9/1/2020</a:t>
+              <a:t>9/3/2020</a:t>
             </a:fld>
             <a:endParaRPr lang="en-US"/>
           </a:p>
@@ -5949,7 +3159,7 @@
           <a:p>
             <a:fld id="{E2F8E41F-600C-44C8-A86B-0BC25D46D26A}" type="datetimeFigureOut">
               <a:rPr lang="en-US" smtClean="0"/>
-              <a:t>9/1/2020</a:t>
+              <a:t>9/3/2020</a:t>
             </a:fld>
             <a:endParaRPr lang="en-US"/>
           </a:p>
@@ -6456,8 +3666,8 @@
           </a:prstGeom>
         </p:spPr>
       </p:pic>
-      <mc:AlternateContent xmlns:mc="http://schemas.openxmlformats.org/markup-compatibility/2006">
-        <mc:Choice xmlns:a14="http://schemas.microsoft.com/office/drawing/2010/main" Requires="a14">
+      <mc:AlternateContent xmlns:mc="http://schemas.openxmlformats.org/markup-compatibility/2006" xmlns:a14="http://schemas.microsoft.com/office/drawing/2010/main">
+        <mc:Choice Requires="a14">
           <p:sp>
             <p:nvSpPr>
               <p:cNvPr id="6" name="TextBox 5">
@@ -6637,6 +3847,7 @@
                 </a:endParaRPr>
               </a:p>
               <a:p>
+                <a:pPr/>
                 <a14:m>
                   <m:oMathPara xmlns:m="http://schemas.openxmlformats.org/officeDocument/2006/math">
                     <m:oMathParaPr>
@@ -6696,6 +3907,7 @@
                 </a:endParaRPr>
               </a:p>
               <a:p>
+                <a:pPr/>
                 <a14:m>
                   <m:oMathPara xmlns:m="http://schemas.openxmlformats.org/officeDocument/2006/math">
                     <m:oMathParaPr>
@@ -6755,6 +3967,7 @@
                 </a:endParaRPr>
               </a:p>
               <a:p>
+                <a:pPr/>
                 <a14:m>
                   <m:oMathPara xmlns:m="http://schemas.openxmlformats.org/officeDocument/2006/math">
                     <m:oMathParaPr>
@@ -6816,7 +4029,7 @@
             </p:txBody>
           </p:sp>
         </mc:Choice>
-        <mc:Fallback>
+        <mc:Fallback xmlns="">
           <p:sp>
             <p:nvSpPr>
               <p:cNvPr id="6" name="TextBox 5">
@@ -6891,68 +4104,1207 @@
           <a:chExt cx="0" cy="0"/>
         </a:xfrm>
       </p:grpSpPr>
-      <p:sp>
-        <p:nvSpPr>
-          <p:cNvPr id="2" name="Title 1">
-            <a:extLst>
-              <a:ext uri="{FF2B5EF4-FFF2-40B4-BE49-F238E27FC236}">
-                <a16:creationId xmlns:a16="http://schemas.microsoft.com/office/drawing/2014/main" id="{6B85ABAA-E9E0-416C-A5B3-6F67172BF19F}"/>
-              </a:ext>
-            </a:extLst>
-          </p:cNvPr>
-          <p:cNvSpPr>
-            <a:spLocks noGrp="1"/>
-          </p:cNvSpPr>
-          <p:nvPr>
-            <p:ph type="title"/>
-          </p:nvPr>
-        </p:nvSpPr>
-        <p:spPr/>
-        <p:txBody>
-          <a:bodyPr/>
-          <a:lstStyle/>
-          <a:p>
-            <a:r>
-              <a:rPr lang="en-US" dirty="0"/>
-              <a:t>Relay Tuning</a:t>
-            </a:r>
-          </a:p>
-        </p:txBody>
-      </p:sp>
-      <p:graphicFrame>
-        <p:nvGraphicFramePr>
-          <p:cNvPr id="4" name="Chart 3">
-            <a:extLst>
-              <a:ext uri="{FF2B5EF4-FFF2-40B4-BE49-F238E27FC236}">
-                <a16:creationId xmlns:a16="http://schemas.microsoft.com/office/drawing/2014/main" id="{00000000-0008-0000-0200-000002000000}"/>
-              </a:ext>
-            </a:extLst>
-          </p:cNvPr>
-          <p:cNvGraphicFramePr>
-            <a:graphicFrameLocks noGrp="1"/>
-          </p:cNvGraphicFramePr>
-          <p:nvPr>
-            <p:extLst>
-              <p:ext uri="{D42A27DB-BD31-4B8C-83A1-F6EECF244321}">
-                <p14:modId xmlns:p14="http://schemas.microsoft.com/office/powerpoint/2010/main" val="3157267835"/>
-              </p:ext>
-            </p:extLst>
-          </p:nvPr>
-        </p:nvGraphicFramePr>
-        <p:xfrm>
-          <a:off x="838200" y="1690688"/>
-          <a:ext cx="8340870" cy="4483244"/>
-        </p:xfrm>
-        <a:graphic>
-          <a:graphicData uri="http://schemas.openxmlformats.org/drawingml/2006/chart">
-            <c:chart xmlns:c="http://schemas.openxmlformats.org/drawingml/2006/chart" xmlns:r="http://schemas.openxmlformats.org/officeDocument/2006/relationships" r:id="rId2"/>
-          </a:graphicData>
-        </a:graphic>
-      </p:graphicFrame>
+      <mc:AlternateContent xmlns:mc="http://schemas.openxmlformats.org/markup-compatibility/2006" xmlns:a14="http://schemas.microsoft.com/office/drawing/2010/main">
+        <mc:Choice Requires="a14">
+          <p:sp>
+            <p:nvSpPr>
+              <p:cNvPr id="5" name="TextBox 4">
+                <a:extLst>
+                  <a:ext uri="{FF2B5EF4-FFF2-40B4-BE49-F238E27FC236}">
+                    <a16:creationId xmlns:a16="http://schemas.microsoft.com/office/drawing/2014/main" id="{4FD1273A-91BC-421B-900B-008C1A6EEFAA}"/>
+                  </a:ext>
+                </a:extLst>
+              </p:cNvPr>
+              <p:cNvSpPr txBox="1"/>
+              <p:nvPr/>
+            </p:nvSpPr>
+            <p:spPr>
+              <a:xfrm>
+                <a:off x="295276" y="405480"/>
+                <a:ext cx="3214574" cy="3023520"/>
+              </a:xfrm>
+              <a:prstGeom prst="rect">
+                <a:avLst/>
+              </a:prstGeom>
+              <a:noFill/>
+            </p:spPr>
+            <p:txBody>
+              <a:bodyPr wrap="square" rtlCol="0">
+                <a:spAutoFit/>
+              </a:bodyPr>
+              <a:lstStyle/>
+              <a:p>
+                <a14:m>
+                  <m:oMath xmlns:m="http://schemas.openxmlformats.org/officeDocument/2006/math">
+                    <m:r>
+                      <a:rPr lang="en-US" b="0" i="1" smtClean="0">
+                        <a:latin typeface="Cambria Math" panose="02040503050406030204" pitchFamily="18" charset="0"/>
+                      </a:rPr>
+                      <m:t>𝑦</m:t>
+                    </m:r>
+                    <m:d>
+                      <m:dPr>
+                        <m:ctrlPr>
+                          <a:rPr lang="en-US" b="0" i="1" smtClean="0">
+                            <a:latin typeface="Cambria Math" panose="02040503050406030204" pitchFamily="18" charset="0"/>
+                          </a:rPr>
+                        </m:ctrlPr>
+                      </m:dPr>
+                      <m:e>
+                        <m:r>
+                          <a:rPr lang="en-US" b="0" i="1" smtClean="0">
+                            <a:latin typeface="Cambria Math" panose="02040503050406030204" pitchFamily="18" charset="0"/>
+                          </a:rPr>
+                          <m:t>𝑡</m:t>
+                        </m:r>
+                      </m:e>
+                    </m:d>
+                    <m:r>
+                      <a:rPr lang="en-US" b="0" i="1" smtClean="0">
+                        <a:latin typeface="Cambria Math" panose="02040503050406030204" pitchFamily="18" charset="0"/>
+                      </a:rPr>
+                      <m:t>:</m:t>
+                    </m:r>
+                    <m:r>
+                      <a:rPr lang="en-US" b="0" i="1" smtClean="0">
+                        <a:latin typeface="Cambria Math" panose="02040503050406030204" pitchFamily="18" charset="0"/>
+                      </a:rPr>
+                      <m:t>𝑜𝑢𝑡𝑝𝑢𝑡</m:t>
+                    </m:r>
+                    <m:r>
+                      <a:rPr lang="en-US" b="0" i="1" smtClean="0">
+                        <a:latin typeface="Cambria Math" panose="02040503050406030204" pitchFamily="18" charset="0"/>
+                      </a:rPr>
+                      <m:t>, </m:t>
+                    </m:r>
+                    <m:r>
+                      <a:rPr lang="en-US" b="0" i="1" smtClean="0">
+                        <a:latin typeface="Cambria Math" panose="02040503050406030204" pitchFamily="18" charset="0"/>
+                      </a:rPr>
+                      <m:t>𝑡𝑒𝑚𝑝𝑒𝑟𝑎𝑡𝑢𝑟𝑒</m:t>
+                    </m:r>
+                    <m:r>
+                      <a:rPr lang="en-US" b="0" i="1" smtClean="0">
+                        <a:latin typeface="Cambria Math" panose="02040503050406030204" pitchFamily="18" charset="0"/>
+                      </a:rPr>
+                      <m:t> [℃</m:t>
+                    </m:r>
+                  </m:oMath>
+                </a14:m>
+                <a:r>
+                  <a:rPr lang="en-US" dirty="0"/>
+                  <a:t>]</a:t>
+                </a:r>
+                <a14:m>
+                  <m:oMath xmlns:m="http://schemas.openxmlformats.org/officeDocument/2006/math">
+                    <m:r>
+                      <a:rPr lang="en-US" b="0" i="1" smtClean="0">
+                        <a:latin typeface="Cambria Math" panose="02040503050406030204" pitchFamily="18" charset="0"/>
+                      </a:rPr>
+                      <m:t>𝑢</m:t>
+                    </m:r>
+                    <m:d>
+                      <m:dPr>
+                        <m:ctrlPr>
+                          <a:rPr lang="en-US" b="0" i="1" smtClean="0">
+                            <a:latin typeface="Cambria Math" panose="02040503050406030204" pitchFamily="18" charset="0"/>
+                          </a:rPr>
+                        </m:ctrlPr>
+                      </m:dPr>
+                      <m:e>
+                        <m:r>
+                          <a:rPr lang="en-US" b="0" i="1" smtClean="0">
+                            <a:latin typeface="Cambria Math" panose="02040503050406030204" pitchFamily="18" charset="0"/>
+                          </a:rPr>
+                          <m:t>𝑡</m:t>
+                        </m:r>
+                      </m:e>
+                    </m:d>
+                    <m:r>
+                      <a:rPr lang="en-US" b="0" i="1" smtClean="0">
+                        <a:latin typeface="Cambria Math" panose="02040503050406030204" pitchFamily="18" charset="0"/>
+                      </a:rPr>
+                      <m:t>:</m:t>
+                    </m:r>
+                    <m:r>
+                      <a:rPr lang="en-US" b="0" i="1" smtClean="0">
+                        <a:latin typeface="Cambria Math" panose="02040503050406030204" pitchFamily="18" charset="0"/>
+                      </a:rPr>
+                      <m:t>𝑖𝑛𝑝𝑢𝑡</m:t>
+                    </m:r>
+                    <m:r>
+                      <a:rPr lang="en-US" b="0" i="1" smtClean="0">
+                        <a:latin typeface="Cambria Math" panose="02040503050406030204" pitchFamily="18" charset="0"/>
+                      </a:rPr>
+                      <m:t>, </m:t>
+                    </m:r>
+                    <m:r>
+                      <a:rPr lang="en-US" b="0" i="1" smtClean="0">
+                        <a:latin typeface="Cambria Math" panose="02040503050406030204" pitchFamily="18" charset="0"/>
+                      </a:rPr>
+                      <m:t>𝑝𝑜𝑤𝑒𝑟</m:t>
+                    </m:r>
+                    <m:r>
+                      <a:rPr lang="en-US" b="0" i="1" smtClean="0">
+                        <a:latin typeface="Cambria Math" panose="02040503050406030204" pitchFamily="18" charset="0"/>
+                      </a:rPr>
+                      <m:t> </m:t>
+                    </m:r>
+                    <m:d>
+                      <m:dPr>
+                        <m:begChr m:val="["/>
+                        <m:endChr m:val="]"/>
+                        <m:ctrlPr>
+                          <a:rPr lang="en-US" b="0" i="1" smtClean="0">
+                            <a:latin typeface="Cambria Math" panose="02040503050406030204" pitchFamily="18" charset="0"/>
+                          </a:rPr>
+                        </m:ctrlPr>
+                      </m:dPr>
+                      <m:e>
+                        <m:r>
+                          <a:rPr lang="en-US" b="0" i="1" smtClean="0">
+                            <a:latin typeface="Cambria Math" panose="02040503050406030204" pitchFamily="18" charset="0"/>
+                          </a:rPr>
+                          <m:t>𝑘𝑊</m:t>
+                        </m:r>
+                      </m:e>
+                    </m:d>
+                  </m:oMath>
+                </a14:m>
+                <a:endParaRPr lang="en-US" b="0" dirty="0"/>
+              </a:p>
+              <a:p>
+                <a:endParaRPr lang="en-US" dirty="0"/>
+              </a:p>
+              <a:p>
+                <a:endParaRPr lang="en-US" dirty="0"/>
+              </a:p>
+              <a:p>
+                <a:endParaRPr lang="en-US" sz="2800" i="1" dirty="0">
+                  <a:latin typeface="Cambria Math" panose="02040503050406030204" pitchFamily="18" charset="0"/>
+                </a:endParaRPr>
+              </a:p>
+              <a:p>
+                <a:pPr/>
+                <a14:m>
+                  <m:oMathPara xmlns:m="http://schemas.openxmlformats.org/officeDocument/2006/math">
+                    <m:oMathParaPr>
+                      <m:jc m:val="centerGroup"/>
+                    </m:oMathParaPr>
+                    <m:oMath xmlns:m="http://schemas.openxmlformats.org/officeDocument/2006/math">
+                      <m:sSub>
+                        <m:sSubPr>
+                          <m:ctrlPr>
+                            <a:rPr lang="en-US" sz="2800" i="1" smtClean="0">
+                              <a:solidFill>
+                                <a:srgbClr val="FF0000"/>
+                              </a:solidFill>
+                              <a:latin typeface="Cambria Math" panose="02040503050406030204" pitchFamily="18" charset="0"/>
+                            </a:rPr>
+                          </m:ctrlPr>
+                        </m:sSubPr>
+                        <m:e>
+                          <m:r>
+                            <a:rPr lang="en-US" sz="2800" b="0" i="1" smtClean="0">
+                              <a:solidFill>
+                                <a:srgbClr val="FF0000"/>
+                              </a:solidFill>
+                              <a:latin typeface="Cambria Math" panose="02040503050406030204" pitchFamily="18" charset="0"/>
+                            </a:rPr>
+                            <m:t>𝐾</m:t>
+                          </m:r>
+                        </m:e>
+                        <m:sub>
+                          <m:r>
+                            <a:rPr lang="en-US" sz="2800" b="0" i="1" smtClean="0">
+                              <a:solidFill>
+                                <a:srgbClr val="FF0000"/>
+                              </a:solidFill>
+                              <a:latin typeface="Cambria Math" panose="02040503050406030204" pitchFamily="18" charset="0"/>
+                            </a:rPr>
+                            <m:t>𝑝</m:t>
+                          </m:r>
+                        </m:sub>
+                      </m:sSub>
+                      <m:r>
+                        <a:rPr lang="en-US" sz="2800" b="0" i="1" smtClean="0">
+                          <a:solidFill>
+                            <a:srgbClr val="FF0000"/>
+                          </a:solidFill>
+                          <a:latin typeface="Cambria Math" panose="02040503050406030204" pitchFamily="18" charset="0"/>
+                        </a:rPr>
+                        <m:t>=103.53</m:t>
+                      </m:r>
+                    </m:oMath>
+                  </m:oMathPara>
+                </a14:m>
+                <a:endParaRPr lang="en-US" sz="2800" b="0" dirty="0">
+                  <a:solidFill>
+                    <a:srgbClr val="FF0000"/>
+                  </a:solidFill>
+                </a:endParaRPr>
+              </a:p>
+              <a:p>
+                <a:pPr/>
+                <a14:m>
+                  <m:oMathPara xmlns:m="http://schemas.openxmlformats.org/officeDocument/2006/math">
+                    <m:oMathParaPr>
+                      <m:jc m:val="centerGroup"/>
+                    </m:oMathParaPr>
+                    <m:oMath xmlns:m="http://schemas.openxmlformats.org/officeDocument/2006/math">
+                      <m:sSub>
+                        <m:sSubPr>
+                          <m:ctrlPr>
+                            <a:rPr lang="en-US" sz="2800" i="1" smtClean="0">
+                              <a:solidFill>
+                                <a:srgbClr val="FF0000"/>
+                              </a:solidFill>
+                              <a:latin typeface="Cambria Math" panose="02040503050406030204" pitchFamily="18" charset="0"/>
+                            </a:rPr>
+                          </m:ctrlPr>
+                        </m:sSubPr>
+                        <m:e>
+                          <m:r>
+                            <a:rPr lang="en-US" sz="2800" b="0" i="1" smtClean="0">
+                              <a:solidFill>
+                                <a:srgbClr val="FF0000"/>
+                              </a:solidFill>
+                              <a:latin typeface="Cambria Math" panose="02040503050406030204" pitchFamily="18" charset="0"/>
+                            </a:rPr>
+                            <m:t>𝜏</m:t>
+                          </m:r>
+                        </m:e>
+                        <m:sub>
+                          <m:r>
+                            <a:rPr lang="en-US" sz="2800" b="0" i="1" smtClean="0">
+                              <a:solidFill>
+                                <a:srgbClr val="FF0000"/>
+                              </a:solidFill>
+                              <a:latin typeface="Cambria Math" panose="02040503050406030204" pitchFamily="18" charset="0"/>
+                            </a:rPr>
+                            <m:t>𝑝</m:t>
+                          </m:r>
+                        </m:sub>
+                      </m:sSub>
+                      <m:r>
+                        <a:rPr lang="en-US" sz="2800" b="0" i="1" smtClean="0">
+                          <a:solidFill>
+                            <a:srgbClr val="FF0000"/>
+                          </a:solidFill>
+                          <a:latin typeface="Cambria Math" panose="02040503050406030204" pitchFamily="18" charset="0"/>
+                        </a:rPr>
+                        <m:t>=17.1</m:t>
+                      </m:r>
+                    </m:oMath>
+                  </m:oMathPara>
+                </a14:m>
+                <a:endParaRPr lang="en-US" sz="2800" b="0" dirty="0">
+                  <a:solidFill>
+                    <a:srgbClr val="FF0000"/>
+                  </a:solidFill>
+                </a:endParaRPr>
+              </a:p>
+              <a:p>
+                <a:pPr/>
+                <a14:m>
+                  <m:oMathPara xmlns:m="http://schemas.openxmlformats.org/officeDocument/2006/math">
+                    <m:oMathParaPr>
+                      <m:jc m:val="centerGroup"/>
+                    </m:oMathParaPr>
+                    <m:oMath xmlns:m="http://schemas.openxmlformats.org/officeDocument/2006/math">
+                      <m:sSub>
+                        <m:sSubPr>
+                          <m:ctrlPr>
+                            <a:rPr lang="en-US" sz="2800" i="1" smtClean="0">
+                              <a:solidFill>
+                                <a:srgbClr val="FF0000"/>
+                              </a:solidFill>
+                              <a:latin typeface="Cambria Math" panose="02040503050406030204" pitchFamily="18" charset="0"/>
+                            </a:rPr>
+                          </m:ctrlPr>
+                        </m:sSubPr>
+                        <m:e>
+                          <m:r>
+                            <a:rPr lang="en-US" sz="2800" b="0" i="1" smtClean="0">
+                              <a:solidFill>
+                                <a:srgbClr val="FF0000"/>
+                              </a:solidFill>
+                              <a:latin typeface="Cambria Math" panose="02040503050406030204" pitchFamily="18" charset="0"/>
+                            </a:rPr>
+                            <m:t>𝜃</m:t>
+                          </m:r>
+                        </m:e>
+                        <m:sub>
+                          <m:r>
+                            <a:rPr lang="en-US" sz="2800" b="0" i="1" smtClean="0">
+                              <a:solidFill>
+                                <a:srgbClr val="FF0000"/>
+                              </a:solidFill>
+                              <a:latin typeface="Cambria Math" panose="02040503050406030204" pitchFamily="18" charset="0"/>
+                            </a:rPr>
+                            <m:t>𝑝</m:t>
+                          </m:r>
+                        </m:sub>
+                      </m:sSub>
+                      <m:r>
+                        <a:rPr lang="en-US" sz="2800" b="0" i="1" smtClean="0">
+                          <a:solidFill>
+                            <a:srgbClr val="FF0000"/>
+                          </a:solidFill>
+                          <a:latin typeface="Cambria Math" panose="02040503050406030204" pitchFamily="18" charset="0"/>
+                        </a:rPr>
+                        <m:t>=1.8</m:t>
+                      </m:r>
+                    </m:oMath>
+                  </m:oMathPara>
+                </a14:m>
+                <a:endParaRPr lang="en-US" sz="2800" dirty="0">
+                  <a:solidFill>
+                    <a:srgbClr val="FF0000"/>
+                  </a:solidFill>
+                </a:endParaRPr>
+              </a:p>
+            </p:txBody>
+          </p:sp>
+        </mc:Choice>
+        <mc:Fallback xmlns="">
+          <p:sp>
+            <p:nvSpPr>
+              <p:cNvPr id="5" name="TextBox 4">
+                <a:extLst>
+                  <a:ext uri="{FF2B5EF4-FFF2-40B4-BE49-F238E27FC236}">
+                    <a16:creationId xmlns:a16="http://schemas.microsoft.com/office/drawing/2014/main" id="{4FD1273A-91BC-421B-900B-008C1A6EEFAA}"/>
+                  </a:ext>
+                </a:extLst>
+              </p:cNvPr>
+              <p:cNvSpPr txBox="1">
+                <a:spLocks noRot="1" noChangeAspect="1" noMove="1" noResize="1" noEditPoints="1" noAdjustHandles="1" noChangeArrowheads="1" noChangeShapeType="1" noTextEdit="1"/>
+              </p:cNvSpPr>
+              <p:nvPr/>
+            </p:nvSpPr>
+            <p:spPr>
+              <a:xfrm>
+                <a:off x="295276" y="405480"/>
+                <a:ext cx="3214574" cy="3023520"/>
+              </a:xfrm>
+              <a:prstGeom prst="rect">
+                <a:avLst/>
+              </a:prstGeom>
+              <a:blipFill>
+                <a:blip r:embed="rId2"/>
+                <a:stretch>
+                  <a:fillRect t="-1210" r="-1515"/>
+                </a:stretch>
+              </a:blipFill>
+            </p:spPr>
+            <p:txBody>
+              <a:bodyPr/>
+              <a:lstStyle/>
+              <a:p>
+                <a:r>
+                  <a:rPr lang="en-US">
+                    <a:noFill/>
+                  </a:rPr>
+                  <a:t> </a:t>
+                </a:r>
+              </a:p>
+            </p:txBody>
+          </p:sp>
+        </mc:Fallback>
+      </mc:AlternateContent>
+      <p:pic>
+        <p:nvPicPr>
+          <p:cNvPr id="7" name="Picture 6">
+            <a:extLst>
+              <a:ext uri="{FF2B5EF4-FFF2-40B4-BE49-F238E27FC236}">
+                <a16:creationId xmlns:a16="http://schemas.microsoft.com/office/drawing/2014/main" id="{33E2B3B0-AEB4-4FA5-BB7D-071573FDFE5A}"/>
+              </a:ext>
+            </a:extLst>
+          </p:cNvPr>
+          <p:cNvPicPr>
+            <a:picLocks noChangeAspect="1"/>
+          </p:cNvPicPr>
+          <p:nvPr/>
+        </p:nvPicPr>
+        <p:blipFill>
+          <a:blip r:embed="rId3"/>
+          <a:stretch>
+            <a:fillRect/>
+          </a:stretch>
+        </p:blipFill>
+        <p:spPr>
+          <a:xfrm>
+            <a:off x="3509850" y="140288"/>
+            <a:ext cx="8409818" cy="6312232"/>
+          </a:xfrm>
+          <a:prstGeom prst="rect">
+            <a:avLst/>
+          </a:prstGeom>
+        </p:spPr>
+      </p:pic>
+      <p:grpSp>
+        <p:nvGrpSpPr>
+          <p:cNvPr id="4" name="Group 3">
+            <a:extLst>
+              <a:ext uri="{FF2B5EF4-FFF2-40B4-BE49-F238E27FC236}">
+                <a16:creationId xmlns:a16="http://schemas.microsoft.com/office/drawing/2014/main" id="{343D4652-D0AD-42FA-8A6C-F419D96FD61C}"/>
+              </a:ext>
+            </a:extLst>
+          </p:cNvPr>
+          <p:cNvGrpSpPr/>
+          <p:nvPr/>
+        </p:nvGrpSpPr>
+        <p:grpSpPr>
+          <a:xfrm>
+            <a:off x="176080" y="3874168"/>
+            <a:ext cx="3882573" cy="2055389"/>
+            <a:chOff x="176080" y="3874168"/>
+            <a:chExt cx="3882573" cy="2055389"/>
+          </a:xfrm>
+        </p:grpSpPr>
+        <p:sp>
+          <p:nvSpPr>
+            <p:cNvPr id="2" name="TextBox 1">
+              <a:extLst>
+                <a:ext uri="{FF2B5EF4-FFF2-40B4-BE49-F238E27FC236}">
+                  <a16:creationId xmlns:a16="http://schemas.microsoft.com/office/drawing/2014/main" id="{49C490E0-1399-420B-95B3-B94593600E4B}"/>
+                </a:ext>
+              </a:extLst>
+            </p:cNvPr>
+            <p:cNvSpPr txBox="1"/>
+            <p:nvPr/>
+          </p:nvSpPr>
+          <p:spPr>
+            <a:xfrm>
+              <a:off x="176080" y="3898232"/>
+              <a:ext cx="3882573" cy="2031325"/>
+            </a:xfrm>
+            <a:prstGeom prst="rect">
+              <a:avLst/>
+            </a:prstGeom>
+            <a:noFill/>
+          </p:spPr>
+          <p:txBody>
+            <a:bodyPr wrap="square" rtlCol="0">
+              <a:spAutoFit/>
+            </a:bodyPr>
+            <a:lstStyle/>
+            <a:p>
+              <a:r>
+                <a:rPr lang="en-US" dirty="0"/>
+                <a:t>Goodness of fit:</a:t>
+              </a:r>
+            </a:p>
+            <a:p>
+              <a:r>
+                <a:rPr lang="en-US" dirty="0"/>
+                <a:t>	SSE:2915</a:t>
+              </a:r>
+            </a:p>
+            <a:p>
+              <a:r>
+                <a:rPr lang="en-US" dirty="0"/>
+                <a:t>	R-square: 0.6669</a:t>
+              </a:r>
+            </a:p>
+            <a:p>
+              <a:r>
+                <a:rPr lang="en-US" dirty="0"/>
+                <a:t>	Adjusted R-square: 0.6654</a:t>
+              </a:r>
+            </a:p>
+            <a:p>
+              <a:r>
+                <a:rPr lang="en-US" dirty="0"/>
+                <a:t>	RMSE: 3.674</a:t>
+              </a:r>
+            </a:p>
+            <a:p>
+              <a:r>
+                <a:rPr lang="en-US" dirty="0"/>
+                <a:t>	MSE:13.498276</a:t>
+              </a:r>
+            </a:p>
+            <a:p>
+              <a:endParaRPr lang="en-US" dirty="0"/>
+            </a:p>
+          </p:txBody>
+        </p:sp>
+        <p:sp>
+          <p:nvSpPr>
+            <p:cNvPr id="3" name="Rectangle 2">
+              <a:extLst>
+                <a:ext uri="{FF2B5EF4-FFF2-40B4-BE49-F238E27FC236}">
+                  <a16:creationId xmlns:a16="http://schemas.microsoft.com/office/drawing/2014/main" id="{EBAD0606-146D-425D-80C2-F071536BF72D}"/>
+                </a:ext>
+              </a:extLst>
+            </p:cNvPr>
+            <p:cNvSpPr/>
+            <p:nvPr/>
+          </p:nvSpPr>
+          <p:spPr>
+            <a:xfrm>
+              <a:off x="184484" y="3874168"/>
+              <a:ext cx="3689684" cy="1876927"/>
+            </a:xfrm>
+            <a:prstGeom prst="rect">
+              <a:avLst/>
+            </a:prstGeom>
+            <a:noFill/>
+            <a:ln>
+              <a:solidFill>
+                <a:schemeClr val="tx1">
+                  <a:lumMod val="95000"/>
+                  <a:lumOff val="5000"/>
+                </a:schemeClr>
+              </a:solidFill>
+            </a:ln>
+          </p:spPr>
+          <p:style>
+            <a:lnRef idx="2">
+              <a:schemeClr val="accent1">
+                <a:shade val="50000"/>
+              </a:schemeClr>
+            </a:lnRef>
+            <a:fillRef idx="1">
+              <a:schemeClr val="accent1"/>
+            </a:fillRef>
+            <a:effectRef idx="0">
+              <a:schemeClr val="accent1"/>
+            </a:effectRef>
+            <a:fontRef idx="minor">
+              <a:schemeClr val="lt1"/>
+            </a:fontRef>
+          </p:style>
+          <p:txBody>
+            <a:bodyPr rtlCol="0" anchor="ctr"/>
+            <a:lstStyle/>
+            <a:p>
+              <a:pPr algn="ctr"/>
+              <a:endParaRPr lang="en-US"/>
+            </a:p>
+          </p:txBody>
+        </p:sp>
+      </p:grpSp>
     </p:spTree>
     <p:extLst>
       <p:ext uri="{BB962C8B-B14F-4D97-AF65-F5344CB8AC3E}">
-        <p14:creationId xmlns:p14="http://schemas.microsoft.com/office/powerpoint/2010/main" val="3777947122"/>
+        <p14:creationId xmlns:p14="http://schemas.microsoft.com/office/powerpoint/2010/main" val="2637080956"/>
+      </p:ext>
+    </p:extLst>
+  </p:cSld>
+  <p:clrMapOvr>
+    <a:masterClrMapping/>
+  </p:clrMapOvr>
+</p:sld>
+</file>
+
+<file path=ppt/slides/slide3.xml><?xml version="1.0" encoding="utf-8"?>
+<p:sld xmlns:a="http://schemas.openxmlformats.org/drawingml/2006/main" xmlns:r="http://schemas.openxmlformats.org/officeDocument/2006/relationships" xmlns:p="http://schemas.openxmlformats.org/presentationml/2006/main">
+  <p:cSld>
+    <p:spTree>
+      <p:nvGrpSpPr>
+        <p:cNvPr id="1" name=""/>
+        <p:cNvGrpSpPr/>
+        <p:nvPr/>
+      </p:nvGrpSpPr>
+      <p:grpSpPr>
+        <a:xfrm>
+          <a:off x="0" y="0"/>
+          <a:ext cx="0" cy="0"/>
+          <a:chOff x="0" y="0"/>
+          <a:chExt cx="0" cy="0"/>
+        </a:xfrm>
+      </p:grpSpPr>
+      <mc:AlternateContent xmlns:mc="http://schemas.openxmlformats.org/markup-compatibility/2006" xmlns:a14="http://schemas.microsoft.com/office/drawing/2010/main">
+        <mc:Choice Requires="a14">
+          <p:sp>
+            <p:nvSpPr>
+              <p:cNvPr id="5" name="TextBox 4">
+                <a:extLst>
+                  <a:ext uri="{FF2B5EF4-FFF2-40B4-BE49-F238E27FC236}">
+                    <a16:creationId xmlns:a16="http://schemas.microsoft.com/office/drawing/2014/main" id="{4FD1273A-91BC-421B-900B-008C1A6EEFAA}"/>
+                  </a:ext>
+                </a:extLst>
+              </p:cNvPr>
+              <p:cNvSpPr txBox="1"/>
+              <p:nvPr/>
+            </p:nvSpPr>
+            <p:spPr>
+              <a:xfrm>
+                <a:off x="295276" y="405480"/>
+                <a:ext cx="3214574" cy="3023520"/>
+              </a:xfrm>
+              <a:prstGeom prst="rect">
+                <a:avLst/>
+              </a:prstGeom>
+              <a:noFill/>
+            </p:spPr>
+            <p:txBody>
+              <a:bodyPr wrap="square" rtlCol="0">
+                <a:spAutoFit/>
+              </a:bodyPr>
+              <a:lstStyle/>
+              <a:p>
+                <a14:m>
+                  <m:oMath xmlns:m="http://schemas.openxmlformats.org/officeDocument/2006/math">
+                    <m:r>
+                      <a:rPr lang="en-US" b="0" i="1" smtClean="0">
+                        <a:latin typeface="Cambria Math" panose="02040503050406030204" pitchFamily="18" charset="0"/>
+                      </a:rPr>
+                      <m:t>𝑦</m:t>
+                    </m:r>
+                    <m:d>
+                      <m:dPr>
+                        <m:ctrlPr>
+                          <a:rPr lang="en-US" b="0" i="1" smtClean="0">
+                            <a:latin typeface="Cambria Math" panose="02040503050406030204" pitchFamily="18" charset="0"/>
+                          </a:rPr>
+                        </m:ctrlPr>
+                      </m:dPr>
+                      <m:e>
+                        <m:r>
+                          <a:rPr lang="en-US" b="0" i="1" smtClean="0">
+                            <a:latin typeface="Cambria Math" panose="02040503050406030204" pitchFamily="18" charset="0"/>
+                          </a:rPr>
+                          <m:t>𝑡</m:t>
+                        </m:r>
+                      </m:e>
+                    </m:d>
+                    <m:r>
+                      <a:rPr lang="en-US" b="0" i="1" smtClean="0">
+                        <a:latin typeface="Cambria Math" panose="02040503050406030204" pitchFamily="18" charset="0"/>
+                      </a:rPr>
+                      <m:t>:</m:t>
+                    </m:r>
+                    <m:r>
+                      <a:rPr lang="en-US" b="0" i="1" smtClean="0">
+                        <a:latin typeface="Cambria Math" panose="02040503050406030204" pitchFamily="18" charset="0"/>
+                      </a:rPr>
+                      <m:t>𝑜𝑢𝑡𝑝𝑢𝑡</m:t>
+                    </m:r>
+                    <m:r>
+                      <a:rPr lang="en-US" b="0" i="1" smtClean="0">
+                        <a:latin typeface="Cambria Math" panose="02040503050406030204" pitchFamily="18" charset="0"/>
+                      </a:rPr>
+                      <m:t>, </m:t>
+                    </m:r>
+                    <m:r>
+                      <a:rPr lang="en-US" b="0" i="1" smtClean="0">
+                        <a:latin typeface="Cambria Math" panose="02040503050406030204" pitchFamily="18" charset="0"/>
+                      </a:rPr>
+                      <m:t>𝑡𝑒𝑚𝑝𝑒𝑟𝑎𝑡𝑢𝑟𝑒</m:t>
+                    </m:r>
+                    <m:r>
+                      <a:rPr lang="en-US" b="0" i="1" smtClean="0">
+                        <a:latin typeface="Cambria Math" panose="02040503050406030204" pitchFamily="18" charset="0"/>
+                      </a:rPr>
+                      <m:t> [℃</m:t>
+                    </m:r>
+                  </m:oMath>
+                </a14:m>
+                <a:r>
+                  <a:rPr lang="en-US" dirty="0"/>
+                  <a:t>]</a:t>
+                </a:r>
+                <a14:m>
+                  <m:oMath xmlns:m="http://schemas.openxmlformats.org/officeDocument/2006/math">
+                    <m:r>
+                      <a:rPr lang="en-US" b="0" i="1" smtClean="0">
+                        <a:latin typeface="Cambria Math" panose="02040503050406030204" pitchFamily="18" charset="0"/>
+                      </a:rPr>
+                      <m:t>𝑢</m:t>
+                    </m:r>
+                    <m:d>
+                      <m:dPr>
+                        <m:ctrlPr>
+                          <a:rPr lang="en-US" b="0" i="1" smtClean="0">
+                            <a:latin typeface="Cambria Math" panose="02040503050406030204" pitchFamily="18" charset="0"/>
+                          </a:rPr>
+                        </m:ctrlPr>
+                      </m:dPr>
+                      <m:e>
+                        <m:r>
+                          <a:rPr lang="en-US" b="0" i="1" smtClean="0">
+                            <a:latin typeface="Cambria Math" panose="02040503050406030204" pitchFamily="18" charset="0"/>
+                          </a:rPr>
+                          <m:t>𝑡</m:t>
+                        </m:r>
+                      </m:e>
+                    </m:d>
+                    <m:r>
+                      <a:rPr lang="en-US" b="0" i="1" smtClean="0">
+                        <a:latin typeface="Cambria Math" panose="02040503050406030204" pitchFamily="18" charset="0"/>
+                      </a:rPr>
+                      <m:t>:</m:t>
+                    </m:r>
+                    <m:r>
+                      <a:rPr lang="en-US" b="0" i="1" smtClean="0">
+                        <a:latin typeface="Cambria Math" panose="02040503050406030204" pitchFamily="18" charset="0"/>
+                      </a:rPr>
+                      <m:t>𝑖𝑛𝑝𝑢𝑡</m:t>
+                    </m:r>
+                    <m:r>
+                      <a:rPr lang="en-US" b="0" i="1" smtClean="0">
+                        <a:latin typeface="Cambria Math" panose="02040503050406030204" pitchFamily="18" charset="0"/>
+                      </a:rPr>
+                      <m:t>, </m:t>
+                    </m:r>
+                    <m:r>
+                      <a:rPr lang="en-US" b="0" i="1" smtClean="0">
+                        <a:latin typeface="Cambria Math" panose="02040503050406030204" pitchFamily="18" charset="0"/>
+                      </a:rPr>
+                      <m:t>𝑝𝑜𝑤𝑒𝑟</m:t>
+                    </m:r>
+                    <m:r>
+                      <a:rPr lang="en-US" b="0" i="1" smtClean="0">
+                        <a:latin typeface="Cambria Math" panose="02040503050406030204" pitchFamily="18" charset="0"/>
+                      </a:rPr>
+                      <m:t> </m:t>
+                    </m:r>
+                    <m:d>
+                      <m:dPr>
+                        <m:begChr m:val="["/>
+                        <m:endChr m:val="]"/>
+                        <m:ctrlPr>
+                          <a:rPr lang="en-US" b="0" i="1" smtClean="0">
+                            <a:latin typeface="Cambria Math" panose="02040503050406030204" pitchFamily="18" charset="0"/>
+                          </a:rPr>
+                        </m:ctrlPr>
+                      </m:dPr>
+                      <m:e>
+                        <m:r>
+                          <a:rPr lang="en-US" b="0" i="1" smtClean="0">
+                            <a:latin typeface="Cambria Math" panose="02040503050406030204" pitchFamily="18" charset="0"/>
+                          </a:rPr>
+                          <m:t>𝑘𝑊</m:t>
+                        </m:r>
+                      </m:e>
+                    </m:d>
+                  </m:oMath>
+                </a14:m>
+                <a:endParaRPr lang="en-US" b="0" dirty="0"/>
+              </a:p>
+              <a:p>
+                <a:endParaRPr lang="en-US" dirty="0"/>
+              </a:p>
+              <a:p>
+                <a:endParaRPr lang="en-US" dirty="0"/>
+              </a:p>
+              <a:p>
+                <a:endParaRPr lang="en-US" sz="2800" i="1" dirty="0">
+                  <a:latin typeface="Cambria Math" panose="02040503050406030204" pitchFamily="18" charset="0"/>
+                </a:endParaRPr>
+              </a:p>
+              <a:p>
+                <a:pPr/>
+                <a14:m>
+                  <m:oMathPara xmlns:m="http://schemas.openxmlformats.org/officeDocument/2006/math">
+                    <m:oMathParaPr>
+                      <m:jc m:val="centerGroup"/>
+                    </m:oMathParaPr>
+                    <m:oMath xmlns:m="http://schemas.openxmlformats.org/officeDocument/2006/math">
+                      <m:sSub>
+                        <m:sSubPr>
+                          <m:ctrlPr>
+                            <a:rPr lang="en-US" sz="2800" i="1" smtClean="0">
+                              <a:solidFill>
+                                <a:srgbClr val="FF0000"/>
+                              </a:solidFill>
+                              <a:latin typeface="Cambria Math" panose="02040503050406030204" pitchFamily="18" charset="0"/>
+                            </a:rPr>
+                          </m:ctrlPr>
+                        </m:sSubPr>
+                        <m:e>
+                          <m:r>
+                            <a:rPr lang="en-US" sz="2800" b="0" i="1" smtClean="0">
+                              <a:solidFill>
+                                <a:srgbClr val="FF0000"/>
+                              </a:solidFill>
+                              <a:latin typeface="Cambria Math" panose="02040503050406030204" pitchFamily="18" charset="0"/>
+                            </a:rPr>
+                            <m:t>𝐾</m:t>
+                          </m:r>
+                        </m:e>
+                        <m:sub>
+                          <m:r>
+                            <a:rPr lang="en-US" sz="2800" b="0" i="1" smtClean="0">
+                              <a:solidFill>
+                                <a:srgbClr val="FF0000"/>
+                              </a:solidFill>
+                              <a:latin typeface="Cambria Math" panose="02040503050406030204" pitchFamily="18" charset="0"/>
+                            </a:rPr>
+                            <m:t>𝑝</m:t>
+                          </m:r>
+                        </m:sub>
+                      </m:sSub>
+                      <m:r>
+                        <a:rPr lang="en-US" sz="2800" b="0" i="1" smtClean="0">
+                          <a:solidFill>
+                            <a:srgbClr val="FF0000"/>
+                          </a:solidFill>
+                          <a:latin typeface="Cambria Math" panose="02040503050406030204" pitchFamily="18" charset="0"/>
+                        </a:rPr>
+                        <m:t>=103.53</m:t>
+                      </m:r>
+                    </m:oMath>
+                  </m:oMathPara>
+                </a14:m>
+                <a:endParaRPr lang="en-US" sz="2800" b="0" dirty="0">
+                  <a:solidFill>
+                    <a:srgbClr val="FF0000"/>
+                  </a:solidFill>
+                </a:endParaRPr>
+              </a:p>
+              <a:p>
+                <a:pPr/>
+                <a14:m>
+                  <m:oMathPara xmlns:m="http://schemas.openxmlformats.org/officeDocument/2006/math">
+                    <m:oMathParaPr>
+                      <m:jc m:val="centerGroup"/>
+                    </m:oMathParaPr>
+                    <m:oMath xmlns:m="http://schemas.openxmlformats.org/officeDocument/2006/math">
+                      <m:sSub>
+                        <m:sSubPr>
+                          <m:ctrlPr>
+                            <a:rPr lang="en-US" sz="2800" i="1" smtClean="0">
+                              <a:solidFill>
+                                <a:srgbClr val="FF0000"/>
+                              </a:solidFill>
+                              <a:latin typeface="Cambria Math" panose="02040503050406030204" pitchFamily="18" charset="0"/>
+                            </a:rPr>
+                          </m:ctrlPr>
+                        </m:sSubPr>
+                        <m:e>
+                          <m:r>
+                            <a:rPr lang="en-US" sz="2800" b="0" i="1" smtClean="0">
+                              <a:solidFill>
+                                <a:srgbClr val="FF0000"/>
+                              </a:solidFill>
+                              <a:latin typeface="Cambria Math" panose="02040503050406030204" pitchFamily="18" charset="0"/>
+                            </a:rPr>
+                            <m:t>𝜏</m:t>
+                          </m:r>
+                        </m:e>
+                        <m:sub>
+                          <m:r>
+                            <a:rPr lang="en-US" sz="2800" b="0" i="1" smtClean="0">
+                              <a:solidFill>
+                                <a:srgbClr val="FF0000"/>
+                              </a:solidFill>
+                              <a:latin typeface="Cambria Math" panose="02040503050406030204" pitchFamily="18" charset="0"/>
+                            </a:rPr>
+                            <m:t>𝑝</m:t>
+                          </m:r>
+                        </m:sub>
+                      </m:sSub>
+                      <m:r>
+                        <a:rPr lang="en-US" sz="2800" b="0" i="1" smtClean="0">
+                          <a:solidFill>
+                            <a:srgbClr val="FF0000"/>
+                          </a:solidFill>
+                          <a:latin typeface="Cambria Math" panose="02040503050406030204" pitchFamily="18" charset="0"/>
+                        </a:rPr>
+                        <m:t>=100</m:t>
+                      </m:r>
+                    </m:oMath>
+                  </m:oMathPara>
+                </a14:m>
+                <a:endParaRPr lang="en-US" sz="2800" b="0" dirty="0">
+                  <a:solidFill>
+                    <a:srgbClr val="FF0000"/>
+                  </a:solidFill>
+                </a:endParaRPr>
+              </a:p>
+              <a:p>
+                <a:pPr/>
+                <a14:m>
+                  <m:oMathPara xmlns:m="http://schemas.openxmlformats.org/officeDocument/2006/math">
+                    <m:oMathParaPr>
+                      <m:jc m:val="centerGroup"/>
+                    </m:oMathParaPr>
+                    <m:oMath xmlns:m="http://schemas.openxmlformats.org/officeDocument/2006/math">
+                      <m:sSub>
+                        <m:sSubPr>
+                          <m:ctrlPr>
+                            <a:rPr lang="en-US" sz="2800" i="1" smtClean="0">
+                              <a:solidFill>
+                                <a:srgbClr val="FF0000"/>
+                              </a:solidFill>
+                              <a:latin typeface="Cambria Math" panose="02040503050406030204" pitchFamily="18" charset="0"/>
+                            </a:rPr>
+                          </m:ctrlPr>
+                        </m:sSubPr>
+                        <m:e>
+                          <m:r>
+                            <a:rPr lang="en-US" sz="2800" b="0" i="1" smtClean="0">
+                              <a:solidFill>
+                                <a:srgbClr val="FF0000"/>
+                              </a:solidFill>
+                              <a:latin typeface="Cambria Math" panose="02040503050406030204" pitchFamily="18" charset="0"/>
+                            </a:rPr>
+                            <m:t>𝜃</m:t>
+                          </m:r>
+                        </m:e>
+                        <m:sub>
+                          <m:r>
+                            <a:rPr lang="en-US" sz="2800" b="0" i="1" smtClean="0">
+                              <a:solidFill>
+                                <a:srgbClr val="FF0000"/>
+                              </a:solidFill>
+                              <a:latin typeface="Cambria Math" panose="02040503050406030204" pitchFamily="18" charset="0"/>
+                            </a:rPr>
+                            <m:t>𝑝</m:t>
+                          </m:r>
+                        </m:sub>
+                      </m:sSub>
+                      <m:r>
+                        <a:rPr lang="en-US" sz="2800" b="0" i="1" smtClean="0">
+                          <a:solidFill>
+                            <a:srgbClr val="FF0000"/>
+                          </a:solidFill>
+                          <a:latin typeface="Cambria Math" panose="02040503050406030204" pitchFamily="18" charset="0"/>
+                        </a:rPr>
+                        <m:t>=1.8</m:t>
+                      </m:r>
+                    </m:oMath>
+                  </m:oMathPara>
+                </a14:m>
+                <a:endParaRPr lang="en-US" sz="2800" dirty="0">
+                  <a:solidFill>
+                    <a:srgbClr val="FF0000"/>
+                  </a:solidFill>
+                </a:endParaRPr>
+              </a:p>
+            </p:txBody>
+          </p:sp>
+        </mc:Choice>
+        <mc:Fallback xmlns="">
+          <p:sp>
+            <p:nvSpPr>
+              <p:cNvPr id="5" name="TextBox 4">
+                <a:extLst>
+                  <a:ext uri="{FF2B5EF4-FFF2-40B4-BE49-F238E27FC236}">
+                    <a16:creationId xmlns:a16="http://schemas.microsoft.com/office/drawing/2014/main" id="{4FD1273A-91BC-421B-900B-008C1A6EEFAA}"/>
+                  </a:ext>
+                </a:extLst>
+              </p:cNvPr>
+              <p:cNvSpPr txBox="1">
+                <a:spLocks noRot="1" noChangeAspect="1" noMove="1" noResize="1" noEditPoints="1" noAdjustHandles="1" noChangeArrowheads="1" noChangeShapeType="1" noTextEdit="1"/>
+              </p:cNvSpPr>
+              <p:nvPr/>
+            </p:nvSpPr>
+            <p:spPr>
+              <a:xfrm>
+                <a:off x="295276" y="405480"/>
+                <a:ext cx="3214574" cy="3023520"/>
+              </a:xfrm>
+              <a:prstGeom prst="rect">
+                <a:avLst/>
+              </a:prstGeom>
+              <a:blipFill>
+                <a:blip r:embed="rId2"/>
+                <a:stretch>
+                  <a:fillRect t="-1210" r="-1515"/>
+                </a:stretch>
+              </a:blipFill>
+            </p:spPr>
+            <p:txBody>
+              <a:bodyPr/>
+              <a:lstStyle/>
+              <a:p>
+                <a:r>
+                  <a:rPr lang="en-US">
+                    <a:noFill/>
+                  </a:rPr>
+                  <a:t> </a:t>
+                </a:r>
+              </a:p>
+            </p:txBody>
+          </p:sp>
+        </mc:Fallback>
+      </mc:AlternateContent>
+      <p:pic>
+        <p:nvPicPr>
+          <p:cNvPr id="2" name="Picture 1">
+            <a:extLst>
+              <a:ext uri="{FF2B5EF4-FFF2-40B4-BE49-F238E27FC236}">
+                <a16:creationId xmlns:a16="http://schemas.microsoft.com/office/drawing/2014/main" id="{EFB2DDC5-12E4-4A69-9194-501C6B7CF5AC}"/>
+              </a:ext>
+            </a:extLst>
+          </p:cNvPr>
+          <p:cNvPicPr>
+            <a:picLocks noChangeAspect="1"/>
+          </p:cNvPicPr>
+          <p:nvPr/>
+        </p:nvPicPr>
+        <p:blipFill>
+          <a:blip r:embed="rId3"/>
+          <a:stretch>
+            <a:fillRect/>
+          </a:stretch>
+        </p:blipFill>
+        <p:spPr>
+          <a:xfrm>
+            <a:off x="3795097" y="371609"/>
+            <a:ext cx="8101627" cy="6080911"/>
+          </a:xfrm>
+          <a:prstGeom prst="rect">
+            <a:avLst/>
+          </a:prstGeom>
+        </p:spPr>
+      </p:pic>
+      <p:grpSp>
+        <p:nvGrpSpPr>
+          <p:cNvPr id="4" name="Group 3">
+            <a:extLst>
+              <a:ext uri="{FF2B5EF4-FFF2-40B4-BE49-F238E27FC236}">
+                <a16:creationId xmlns:a16="http://schemas.microsoft.com/office/drawing/2014/main" id="{359DFF18-DF63-4138-B70B-3229D47D90BB}"/>
+              </a:ext>
+            </a:extLst>
+          </p:cNvPr>
+          <p:cNvGrpSpPr/>
+          <p:nvPr/>
+        </p:nvGrpSpPr>
+        <p:grpSpPr>
+          <a:xfrm>
+            <a:off x="176080" y="3874168"/>
+            <a:ext cx="3882573" cy="2332388"/>
+            <a:chOff x="176080" y="3874168"/>
+            <a:chExt cx="3882573" cy="2332388"/>
+          </a:xfrm>
+        </p:grpSpPr>
+        <p:sp>
+          <p:nvSpPr>
+            <p:cNvPr id="6" name="TextBox 5">
+              <a:extLst>
+                <a:ext uri="{FF2B5EF4-FFF2-40B4-BE49-F238E27FC236}">
+                  <a16:creationId xmlns:a16="http://schemas.microsoft.com/office/drawing/2014/main" id="{05DA8783-54DE-42A4-AFA6-85BF8C1B6347}"/>
+                </a:ext>
+              </a:extLst>
+            </p:cNvPr>
+            <p:cNvSpPr txBox="1"/>
+            <p:nvPr/>
+          </p:nvSpPr>
+          <p:spPr>
+            <a:xfrm>
+              <a:off x="176080" y="3898232"/>
+              <a:ext cx="3882573" cy="2308324"/>
+            </a:xfrm>
+            <a:prstGeom prst="rect">
+              <a:avLst/>
+            </a:prstGeom>
+            <a:noFill/>
+          </p:spPr>
+          <p:txBody>
+            <a:bodyPr wrap="square" rtlCol="0">
+              <a:spAutoFit/>
+            </a:bodyPr>
+            <a:lstStyle/>
+            <a:p>
+              <a:r>
+                <a:rPr lang="en-US" dirty="0"/>
+                <a:t>Goodness of fit:</a:t>
+              </a:r>
+            </a:p>
+            <a:p>
+              <a:r>
+                <a:rPr lang="en-US" dirty="0"/>
+                <a:t>	SSE:80.59</a:t>
+              </a:r>
+            </a:p>
+            <a:p>
+              <a:r>
+                <a:rPr lang="en-US" dirty="0"/>
+                <a:t>	R-square: 0.6914</a:t>
+              </a:r>
+            </a:p>
+            <a:p>
+              <a:r>
+                <a:rPr lang="en-US" dirty="0"/>
+                <a:t>	Adjusted R-square: 0.6899</a:t>
+              </a:r>
+            </a:p>
+            <a:p>
+              <a:r>
+                <a:rPr lang="en-US" dirty="0"/>
+                <a:t>	RMSE: 0.6108</a:t>
+              </a:r>
+            </a:p>
+            <a:p>
+              <a:r>
+                <a:rPr lang="en-US" dirty="0"/>
+                <a:t>	MSE:0.37307664</a:t>
+              </a:r>
+            </a:p>
+            <a:p>
+              <a:endParaRPr lang="en-US" dirty="0"/>
+            </a:p>
+            <a:p>
+              <a:endParaRPr lang="en-US" dirty="0"/>
+            </a:p>
+          </p:txBody>
+        </p:sp>
+        <p:sp>
+          <p:nvSpPr>
+            <p:cNvPr id="7" name="Rectangle 6">
+              <a:extLst>
+                <a:ext uri="{FF2B5EF4-FFF2-40B4-BE49-F238E27FC236}">
+                  <a16:creationId xmlns:a16="http://schemas.microsoft.com/office/drawing/2014/main" id="{FB9838CA-BC68-4CF1-A0A3-59DAA45A77ED}"/>
+                </a:ext>
+              </a:extLst>
+            </p:cNvPr>
+            <p:cNvSpPr/>
+            <p:nvPr/>
+          </p:nvSpPr>
+          <p:spPr>
+            <a:xfrm>
+              <a:off x="184484" y="3874168"/>
+              <a:ext cx="3689684" cy="1876927"/>
+            </a:xfrm>
+            <a:prstGeom prst="rect">
+              <a:avLst/>
+            </a:prstGeom>
+            <a:noFill/>
+            <a:ln>
+              <a:solidFill>
+                <a:schemeClr val="tx1">
+                  <a:lumMod val="95000"/>
+                  <a:lumOff val="5000"/>
+                </a:schemeClr>
+              </a:solidFill>
+            </a:ln>
+          </p:spPr>
+          <p:style>
+            <a:lnRef idx="2">
+              <a:schemeClr val="accent1">
+                <a:shade val="50000"/>
+              </a:schemeClr>
+            </a:lnRef>
+            <a:fillRef idx="1">
+              <a:schemeClr val="accent1"/>
+            </a:fillRef>
+            <a:effectRef idx="0">
+              <a:schemeClr val="accent1"/>
+            </a:effectRef>
+            <a:fontRef idx="minor">
+              <a:schemeClr val="lt1"/>
+            </a:fontRef>
+          </p:style>
+          <p:txBody>
+            <a:bodyPr rtlCol="0" anchor="ctr"/>
+            <a:lstStyle/>
+            <a:p>
+              <a:pPr algn="ctr"/>
+              <a:endParaRPr lang="en-US"/>
+            </a:p>
+          </p:txBody>
+        </p:sp>
+      </p:grpSp>
+    </p:spTree>
+    <p:extLst>
+      <p:ext uri="{BB962C8B-B14F-4D97-AF65-F5344CB8AC3E}">
+        <p14:creationId xmlns:p14="http://schemas.microsoft.com/office/powerpoint/2010/main" val="1442489572"/>
       </p:ext>
     </p:extLst>
   </p:cSld>
@@ -7258,6 +5610,21 @@
 </file>
 
 <file path=customXml/item1.xml><?xml version="1.0" encoding="utf-8"?>
+<?mso-contentType ?>
+<FormTemplates xmlns="http://schemas.microsoft.com/sharepoint/v3/contenttype/forms">
+  <Display>DocumentLibraryForm</Display>
+  <Edit>DocumentLibraryForm</Edit>
+  <New>DocumentLibraryForm</New>
+</FormTemplates>
+</file>
+
+<file path=customXml/item2.xml><?xml version="1.0" encoding="utf-8"?>
+<p:properties xmlns:p="http://schemas.microsoft.com/office/2006/metadata/properties" xmlns:xsi="http://www.w3.org/2001/XMLSchema-instance" xmlns:pc="http://schemas.microsoft.com/office/infopath/2007/PartnerControls">
+  <documentManagement/>
+</p:properties>
+</file>
+
+<file path=customXml/item3.xml><?xml version="1.0" encoding="utf-8"?>
 <ct:contentTypeSchema xmlns:ct="http://schemas.microsoft.com/office/2006/metadata/contentType" xmlns:ma="http://schemas.microsoft.com/office/2006/metadata/properties/metaAttributes" ct:_="" ma:_="" ma:contentTypeName="Document" ma:contentTypeID="0x0101001F59C5132F551343B49231CC40E731BE" ma:contentTypeVersion="11" ma:contentTypeDescription="Create a new document." ma:contentTypeScope="" ma:versionID="567a04435fea19f19fec98a255b9e753">
   <xsd:schema xmlns:xsd="http://www.w3.org/2001/XMLSchema" xmlns:xs="http://www.w3.org/2001/XMLSchema" xmlns:p="http://schemas.microsoft.com/office/2006/metadata/properties" xmlns:ns3="e4b597f2-4263-4e79-be2f-8bad1effc847" xmlns:ns4="4dcc8d54-d295-4d84-a744-cfdfe984b3bc" targetNamespace="http://schemas.microsoft.com/office/2006/metadata/properties" ma:root="true" ma:fieldsID="8fba941258e538a3080d2fe85158acc5" ns3:_="" ns4:_="">
     <xsd:import namespace="e4b597f2-4263-4e79-be2f-8bad1effc847"/>
@@ -7466,22 +5833,24 @@
 </ct:contentTypeSchema>
 </file>
 
-<file path=customXml/item2.xml><?xml version="1.0" encoding="utf-8"?>
-<?mso-contentType ?>
-<FormTemplates xmlns="http://schemas.microsoft.com/sharepoint/v3/contenttype/forms">
-  <Display>DocumentLibraryForm</Display>
-  <Edit>DocumentLibraryForm</Edit>
-  <New>DocumentLibraryForm</New>
-</FormTemplates>
+<file path=customXml/itemProps1.xml><?xml version="1.0" encoding="utf-8"?>
+<ds:datastoreItem xmlns:ds="http://schemas.openxmlformats.org/officeDocument/2006/customXml" ds:itemID="{A661EE1C-7702-454E-938D-8338D43F78D3}">
+  <ds:schemaRefs>
+    <ds:schemaRef ds:uri="http://schemas.microsoft.com/sharepoint/v3/contenttype/forms"/>
+  </ds:schemaRefs>
+</ds:datastoreItem>
 </file>
 
-<file path=customXml/item3.xml><?xml version="1.0" encoding="utf-8"?>
-<p:properties xmlns:p="http://schemas.microsoft.com/office/2006/metadata/properties" xmlns:xsi="http://www.w3.org/2001/XMLSchema-instance" xmlns:pc="http://schemas.microsoft.com/office/infopath/2007/PartnerControls">
-  <documentManagement/>
-</p:properties>
+<file path=customXml/itemProps2.xml><?xml version="1.0" encoding="utf-8"?>
+<ds:datastoreItem xmlns:ds="http://schemas.openxmlformats.org/officeDocument/2006/customXml" ds:itemID="{F868B9CD-1533-430F-858D-1BAB227AB490}">
+  <ds:schemaRefs>
+    <ds:schemaRef ds:uri="http://schemas.microsoft.com/office/2006/metadata/properties"/>
+    <ds:schemaRef ds:uri="http://schemas.microsoft.com/office/infopath/2007/PartnerControls"/>
+  </ds:schemaRefs>
+</ds:datastoreItem>
 </file>
 
-<file path=customXml/itemProps1.xml><?xml version="1.0" encoding="utf-8"?>
+<file path=customXml/itemProps3.xml><?xml version="1.0" encoding="utf-8"?>
 <ds:datastoreItem xmlns:ds="http://schemas.openxmlformats.org/officeDocument/2006/customXml" ds:itemID="{93E30CE9-33F9-4DC4-AA2C-B90EE699F6FE}">
   <ds:schemaRefs>
     <ds:schemaRef ds:uri="http://schemas.microsoft.com/office/2006/metadata/contentType"/>
@@ -7498,29 +5867,4 @@
     <ds:schemaRef ds:uri="http://schemas.microsoft.com/internal/obd"/>
   </ds:schemaRefs>
 </ds:datastoreItem>
-</file>
-
-<file path=customXml/itemProps2.xml><?xml version="1.0" encoding="utf-8"?>
-<ds:datastoreItem xmlns:ds="http://schemas.openxmlformats.org/officeDocument/2006/customXml" ds:itemID="{A661EE1C-7702-454E-938D-8338D43F78D3}">
-  <ds:schemaRefs>
-    <ds:schemaRef ds:uri="http://schemas.microsoft.com/sharepoint/v3/contenttype/forms"/>
-  </ds:schemaRefs>
-</ds:datastoreItem>
-</file>
-
-<file path=customXml/itemProps3.xml><?xml version="1.0" encoding="utf-8"?>
-<ds:datastoreItem xmlns:ds="http://schemas.openxmlformats.org/officeDocument/2006/customXml" ds:itemID="{F868B9CD-1533-430F-858D-1BAB227AB490}">
-  <ds:schemaRefs>
-    <ds:schemaRef ds:uri="http://purl.org/dc/terms/"/>
-    <ds:schemaRef ds:uri="http://schemas.microsoft.com/office/2006/documentManagement/types"/>
-    <ds:schemaRef ds:uri="http://purl.org/dc/dcmitype/"/>
-    <ds:schemaRef ds:uri="http://purl.org/dc/elements/1.1/"/>
-    <ds:schemaRef ds:uri="http://schemas.openxmlformats.org/package/2006/metadata/core-properties"/>
-    <ds:schemaRef ds:uri="4dcc8d54-d295-4d84-a744-cfdfe984b3bc"/>
-    <ds:schemaRef ds:uri="http://schemas.microsoft.com/office/2006/metadata/properties"/>
-    <ds:schemaRef ds:uri="http://www.w3.org/XML/1998/namespace"/>
-    <ds:schemaRef ds:uri="http://schemas.microsoft.com/office/infopath/2007/PartnerControls"/>
-    <ds:schemaRef ds:uri="e4b597f2-4263-4e79-be2f-8bad1effc847"/>
-  </ds:schemaRefs>
-</ds:datastoreItem>
 </file>
</xml_diff>